<commit_message>
update on review paper
Review paper draft is updated as sections, subsections, contents.
Arçelik online meeting presentation added
</commit_message>
<xml_diff>
--- a/Parameter Estimation Works/Arçelik-Online meeting 20.03.2020.pptx
+++ b/Parameter Estimation Works/Arçelik-Online meeting 20.03.2020.pptx
@@ -12,9 +12,11 @@
     <p:sldId id="260" r:id="rId6"/>
     <p:sldId id="264" r:id="rId7"/>
     <p:sldId id="263" r:id="rId8"/>
-    <p:sldId id="261" r:id="rId9"/>
-    <p:sldId id="262" r:id="rId10"/>
-    <p:sldId id="265" r:id="rId11"/>
+    <p:sldId id="266" r:id="rId9"/>
+    <p:sldId id="261" r:id="rId10"/>
+    <p:sldId id="262" r:id="rId11"/>
+    <p:sldId id="267" r:id="rId12"/>
+    <p:sldId id="265" r:id="rId13"/>
   </p:sldIdLst>
   <p:sldSz cx="9144000" cy="6858000" type="screen4x3"/>
   <p:notesSz cx="6858000" cy="9144000"/>
@@ -3154,10 +3156,665 @@
   <p:clrMapOvr>
     <a:masterClrMapping/>
   </p:clrMapOvr>
+  <p:timing>
+    <p:tnLst>
+      <p:par>
+        <p:cTn id="1" dur="indefinite" restart="never" nodeType="tmRoot"/>
+      </p:par>
+    </p:tnLst>
+  </p:timing>
 </p:sld>
 </file>
 
 <file path=ppt/slides/slide10.xml><?xml version="1.0" encoding="utf-8"?>
+<p:sld xmlns:a="http://schemas.openxmlformats.org/drawingml/2006/main" xmlns:r="http://schemas.openxmlformats.org/officeDocument/2006/relationships" xmlns:p="http://schemas.openxmlformats.org/presentationml/2006/main">
+  <p:cSld>
+    <p:spTree>
+      <p:nvGrpSpPr>
+        <p:cNvPr id="1" name=""/>
+        <p:cNvGrpSpPr/>
+        <p:nvPr/>
+      </p:nvGrpSpPr>
+      <p:grpSpPr>
+        <a:xfrm>
+          <a:off x="0" y="0"/>
+          <a:ext cx="0" cy="0"/>
+          <a:chOff x="0" y="0"/>
+          <a:chExt cx="0" cy="0"/>
+        </a:xfrm>
+      </p:grpSpPr>
+      <p:sp>
+        <p:nvSpPr>
+          <p:cNvPr id="2" name="1 Başlık"/>
+          <p:cNvSpPr>
+            <a:spLocks noGrp="1"/>
+          </p:cNvSpPr>
+          <p:nvPr>
+            <p:ph type="title"/>
+          </p:nvPr>
+        </p:nvSpPr>
+        <p:spPr>
+          <a:xfrm>
+            <a:off x="457200" y="274638"/>
+            <a:ext cx="8229600" cy="2074242"/>
+          </a:xfrm>
+        </p:spPr>
+        <p:txBody>
+          <a:bodyPr>
+            <a:normAutofit fontScale="90000"/>
+          </a:bodyPr>
+          <a:lstStyle/>
+          <a:p>
+            <a:pPr lvl="0">
+              <a:defRPr/>
+            </a:pPr>
+            <a:r>
+              <a:rPr lang="tr-TR" b="1" dirty="0" smtClean="0"/>
+              <a:t>A FFT </a:t>
+            </a:r>
+            <a:r>
+              <a:rPr lang="tr-TR" b="1" dirty="0" err="1" smtClean="0"/>
+              <a:t>based</a:t>
+            </a:r>
+            <a:r>
+              <a:rPr lang="tr-TR" b="1" dirty="0" smtClean="0"/>
+              <a:t> </a:t>
+            </a:r>
+            <a:r>
+              <a:rPr lang="tr-TR" b="1" dirty="0" err="1" smtClean="0"/>
+              <a:t>resonance</a:t>
+            </a:r>
+            <a:r>
+              <a:rPr lang="tr-TR" b="1" dirty="0" smtClean="0"/>
+              <a:t> </a:t>
+            </a:r>
+            <a:r>
+              <a:rPr lang="tr-TR" b="1" dirty="0" err="1" smtClean="0"/>
+              <a:t>freq</a:t>
+            </a:r>
+            <a:r>
+              <a:rPr lang="tr-TR" b="1" dirty="0" smtClean="0"/>
+              <a:t>. </a:t>
+            </a:r>
+            <a:r>
+              <a:rPr lang="tr-TR" b="1" dirty="0" err="1" smtClean="0"/>
+              <a:t>Detection</a:t>
+            </a:r>
+            <a:r>
+              <a:rPr lang="tr-TR" b="1" dirty="0" smtClean="0"/>
+              <a:t> </a:t>
+            </a:r>
+            <a:r>
+              <a:rPr lang="tr-TR" b="1" dirty="0" err="1" smtClean="0"/>
+              <a:t>for</a:t>
+            </a:r>
+            <a:r>
+              <a:rPr lang="tr-TR" b="1" dirty="0" smtClean="0"/>
+              <a:t> </a:t>
+            </a:r>
+            <a:r>
+              <a:rPr lang="tr-TR" b="1" dirty="0" err="1" smtClean="0"/>
+              <a:t>Autotuning</a:t>
+            </a:r>
+            <a:r>
+              <a:rPr lang="tr-TR" b="1" dirty="0" smtClean="0"/>
+              <a:t> (</a:t>
+            </a:r>
+            <a:r>
+              <a:rPr lang="tr-TR" b="1" dirty="0" err="1" smtClean="0"/>
+              <a:t>may</a:t>
+            </a:r>
+            <a:r>
+              <a:rPr lang="tr-TR" b="1" dirty="0" smtClean="0"/>
+              <a:t> be </a:t>
+            </a:r>
+            <a:r>
+              <a:rPr lang="tr-TR" b="1" dirty="0" err="1" smtClean="0"/>
+              <a:t>summer</a:t>
+            </a:r>
+            <a:r>
+              <a:rPr lang="tr-TR" b="1" dirty="0" smtClean="0"/>
+              <a:t> </a:t>
+            </a:r>
+            <a:r>
+              <a:rPr lang="tr-TR" b="1" dirty="0" err="1" smtClean="0"/>
+              <a:t>practice</a:t>
+            </a:r>
+            <a:r>
+              <a:rPr lang="tr-TR" b="1" dirty="0" smtClean="0"/>
+              <a:t>)</a:t>
+            </a:r>
+            <a:endParaRPr lang="tr-TR" b="1" dirty="0"/>
+          </a:p>
+        </p:txBody>
+      </p:sp>
+      <p:sp>
+        <p:nvSpPr>
+          <p:cNvPr id="3" name="2 İçerik Yer Tutucusu"/>
+          <p:cNvSpPr>
+            <a:spLocks noGrp="1"/>
+          </p:cNvSpPr>
+          <p:nvPr>
+            <p:ph idx="1"/>
+          </p:nvPr>
+        </p:nvSpPr>
+        <p:spPr>
+          <a:xfrm>
+            <a:off x="457200" y="2420888"/>
+            <a:ext cx="8229600" cy="3705275"/>
+          </a:xfrm>
+        </p:spPr>
+        <p:txBody>
+          <a:bodyPr>
+            <a:normAutofit fontScale="92500" lnSpcReduction="10000"/>
+          </a:bodyPr>
+          <a:lstStyle/>
+          <a:p>
+            <a:r>
+              <a:rPr lang="tr-TR" sz="2400" dirty="0" err="1" smtClean="0"/>
+              <a:t>Chen</a:t>
+            </a:r>
+            <a:r>
+              <a:rPr lang="tr-TR" sz="2400" dirty="0" smtClean="0"/>
+              <a:t> </a:t>
+            </a:r>
+            <a:r>
+              <a:rPr lang="tr-TR" sz="2400" dirty="0" err="1" smtClean="0"/>
+              <a:t>Yangyang</a:t>
+            </a:r>
+            <a:r>
+              <a:rPr lang="tr-TR" sz="2400" dirty="0" smtClean="0"/>
+              <a:t>, </a:t>
+            </a:r>
+            <a:r>
+              <a:rPr lang="tr-TR" sz="2400" dirty="0" err="1" smtClean="0"/>
+              <a:t>Yang</a:t>
+            </a:r>
+            <a:r>
+              <a:rPr lang="tr-TR" sz="2400" dirty="0" smtClean="0"/>
+              <a:t> M., </a:t>
+            </a:r>
+            <a:r>
+              <a:rPr lang="tr-TR" sz="2400" dirty="0" err="1" smtClean="0"/>
+              <a:t>Long</a:t>
+            </a:r>
+            <a:r>
+              <a:rPr lang="tr-TR" sz="2400" dirty="0" smtClean="0"/>
+              <a:t> J., Hu K., </a:t>
+            </a:r>
+            <a:r>
+              <a:rPr lang="tr-TR" sz="2400" dirty="0" err="1" smtClean="0"/>
+              <a:t>Xu</a:t>
+            </a:r>
+            <a:r>
+              <a:rPr lang="tr-TR" sz="2400" dirty="0" smtClean="0"/>
+              <a:t> D., </a:t>
+            </a:r>
+            <a:r>
+              <a:rPr lang="tr-TR" sz="2400" dirty="0" err="1" smtClean="0"/>
+              <a:t>Blaabjerg</a:t>
+            </a:r>
+            <a:r>
+              <a:rPr lang="tr-TR" sz="2400" dirty="0" smtClean="0"/>
+              <a:t> F., </a:t>
+            </a:r>
+            <a:r>
+              <a:rPr lang="en-US" sz="2400" dirty="0" smtClean="0"/>
+              <a:t>Analysis of Oscillation Frequency Deviation in Elastic Coupling Digital Drive System and Robust Notch Filter Strategy</a:t>
+            </a:r>
+            <a:r>
+              <a:rPr lang="tr-TR" sz="2400" dirty="0" smtClean="0"/>
+              <a:t>, IEEE </a:t>
+            </a:r>
+            <a:r>
+              <a:rPr lang="tr-TR" sz="2400" dirty="0" err="1" smtClean="0"/>
+              <a:t>Transactions</a:t>
+            </a:r>
+            <a:r>
+              <a:rPr lang="tr-TR" sz="2400" dirty="0" smtClean="0"/>
+              <a:t> on </a:t>
+            </a:r>
+            <a:r>
+              <a:rPr lang="tr-TR" sz="2400" dirty="0" err="1" smtClean="0"/>
+              <a:t>Industrial</a:t>
+            </a:r>
+            <a:r>
+              <a:rPr lang="tr-TR" sz="2400" dirty="0" smtClean="0"/>
+              <a:t> </a:t>
+            </a:r>
+            <a:r>
+              <a:rPr lang="tr-TR" sz="2400" dirty="0" err="1" smtClean="0"/>
+              <a:t>Electronics</a:t>
+            </a:r>
+            <a:r>
+              <a:rPr lang="tr-TR" sz="2400" dirty="0" smtClean="0"/>
+              <a:t>, 2019.</a:t>
+            </a:r>
+          </a:p>
+          <a:p>
+            <a:r>
+              <a:rPr lang="tr-TR" dirty="0" smtClean="0"/>
+              <a:t>FFT </a:t>
+            </a:r>
+            <a:r>
+              <a:rPr lang="tr-TR" dirty="0" err="1" smtClean="0"/>
+              <a:t>Based</a:t>
+            </a:r>
+            <a:r>
+              <a:rPr lang="tr-TR" dirty="0" smtClean="0"/>
+              <a:t> </a:t>
+            </a:r>
+            <a:r>
+              <a:rPr lang="tr-TR" dirty="0" err="1" smtClean="0"/>
+              <a:t>solutions</a:t>
+            </a:r>
+            <a:endParaRPr lang="tr-TR" dirty="0" smtClean="0"/>
+          </a:p>
+          <a:p>
+            <a:pPr lvl="1"/>
+            <a:r>
+              <a:rPr lang="tr-TR" dirty="0" smtClean="0"/>
+              <a:t>Online </a:t>
+            </a:r>
+            <a:r>
+              <a:rPr lang="tr-TR" dirty="0" err="1" smtClean="0"/>
+              <a:t>Adaptive</a:t>
+            </a:r>
+            <a:r>
+              <a:rPr lang="tr-TR" dirty="0" smtClean="0"/>
+              <a:t> </a:t>
+            </a:r>
+            <a:r>
+              <a:rPr lang="tr-TR" dirty="0" err="1" smtClean="0"/>
+              <a:t>Notch</a:t>
+            </a:r>
+            <a:r>
+              <a:rPr lang="tr-TR" dirty="0" smtClean="0"/>
+              <a:t> </a:t>
+            </a:r>
+            <a:r>
+              <a:rPr lang="tr-TR" dirty="0" err="1" smtClean="0"/>
+              <a:t>Filter</a:t>
+            </a:r>
+            <a:r>
+              <a:rPr lang="tr-TR" dirty="0" smtClean="0"/>
+              <a:t> (OANF)</a:t>
+            </a:r>
+          </a:p>
+          <a:p>
+            <a:pPr lvl="1"/>
+            <a:r>
+              <a:rPr lang="tr-TR" dirty="0" err="1" smtClean="0"/>
+              <a:t>Robust</a:t>
+            </a:r>
+            <a:r>
+              <a:rPr lang="tr-TR" dirty="0" smtClean="0"/>
+              <a:t> Online </a:t>
+            </a:r>
+            <a:r>
+              <a:rPr lang="tr-TR" dirty="0" err="1" smtClean="0"/>
+              <a:t>Adaptive</a:t>
+            </a:r>
+            <a:r>
+              <a:rPr lang="tr-TR" dirty="0" smtClean="0"/>
+              <a:t> </a:t>
+            </a:r>
+            <a:r>
+              <a:rPr lang="tr-TR" dirty="0" err="1" smtClean="0"/>
+              <a:t>Notch</a:t>
+            </a:r>
+            <a:r>
+              <a:rPr lang="tr-TR" dirty="0" smtClean="0"/>
+              <a:t> </a:t>
+            </a:r>
+            <a:r>
+              <a:rPr lang="tr-TR" dirty="0" err="1" smtClean="0"/>
+              <a:t>Filter</a:t>
+            </a:r>
+            <a:r>
+              <a:rPr lang="tr-TR" dirty="0" smtClean="0"/>
+              <a:t> (ROANF)</a:t>
+            </a:r>
+          </a:p>
+          <a:p>
+            <a:pPr lvl="1">
+              <a:buNone/>
+            </a:pPr>
+            <a:r>
+              <a:rPr lang="tr-TR" dirty="0" smtClean="0"/>
+              <a:t>DSP CORTEX A9 </a:t>
+            </a:r>
+            <a:r>
+              <a:rPr lang="tr-TR" dirty="0" smtClean="0">
+                <a:sym typeface="Wingdings" pitchFamily="2" charset="2"/>
+              </a:rPr>
+              <a:t> </a:t>
+            </a:r>
+            <a:r>
+              <a:rPr lang="tr-TR" dirty="0" err="1" smtClean="0">
+                <a:sym typeface="Wingdings" pitchFamily="2" charset="2"/>
+              </a:rPr>
+              <a:t>Speed</a:t>
+            </a:r>
+            <a:r>
+              <a:rPr lang="tr-TR" dirty="0" smtClean="0">
+                <a:sym typeface="Wingdings" pitchFamily="2" charset="2"/>
+              </a:rPr>
+              <a:t> </a:t>
+            </a:r>
+            <a:r>
+              <a:rPr lang="tr-TR" dirty="0" err="1" smtClean="0">
+                <a:sym typeface="Wingdings" pitchFamily="2" charset="2"/>
+              </a:rPr>
+              <a:t>loop</a:t>
+            </a:r>
+            <a:r>
+              <a:rPr lang="tr-TR" dirty="0" smtClean="0">
+                <a:sym typeface="Wingdings" pitchFamily="2" charset="2"/>
+              </a:rPr>
+              <a:t> </a:t>
+            </a:r>
+            <a:r>
+              <a:rPr lang="tr-TR" dirty="0" err="1" smtClean="0">
+                <a:sym typeface="Wingdings" pitchFamily="2" charset="2"/>
+              </a:rPr>
+              <a:t>and</a:t>
+            </a:r>
+            <a:r>
+              <a:rPr lang="tr-TR" dirty="0" smtClean="0">
+                <a:sym typeface="Wingdings" pitchFamily="2" charset="2"/>
+              </a:rPr>
+              <a:t> ROANF</a:t>
+            </a:r>
+          </a:p>
+          <a:p>
+            <a:pPr lvl="1">
+              <a:buNone/>
+            </a:pPr>
+            <a:r>
+              <a:rPr lang="tr-TR" dirty="0" smtClean="0">
+                <a:sym typeface="Wingdings" pitchFamily="2" charset="2"/>
+              </a:rPr>
+              <a:t>FPGA  </a:t>
+            </a:r>
+            <a:r>
+              <a:rPr lang="tr-TR" dirty="0" err="1" smtClean="0">
+                <a:sym typeface="Wingdings" pitchFamily="2" charset="2"/>
+              </a:rPr>
+              <a:t>Current</a:t>
+            </a:r>
+            <a:r>
+              <a:rPr lang="tr-TR" dirty="0" smtClean="0">
+                <a:sym typeface="Wingdings" pitchFamily="2" charset="2"/>
+              </a:rPr>
+              <a:t> </a:t>
+            </a:r>
+            <a:r>
+              <a:rPr lang="tr-TR" dirty="0" err="1" smtClean="0">
+                <a:sym typeface="Wingdings" pitchFamily="2" charset="2"/>
+              </a:rPr>
+              <a:t>Loop</a:t>
+            </a:r>
+            <a:r>
+              <a:rPr lang="tr-TR" dirty="0" smtClean="0">
+                <a:sym typeface="Wingdings" pitchFamily="2" charset="2"/>
+              </a:rPr>
+              <a:t> </a:t>
+            </a:r>
+            <a:r>
+              <a:rPr lang="tr-TR" dirty="0" err="1" smtClean="0">
+                <a:sym typeface="Wingdings" pitchFamily="2" charset="2"/>
+              </a:rPr>
+              <a:t>and</a:t>
+            </a:r>
+            <a:r>
+              <a:rPr lang="tr-TR" dirty="0" smtClean="0">
+                <a:sym typeface="Wingdings" pitchFamily="2" charset="2"/>
+              </a:rPr>
+              <a:t> FFT </a:t>
+            </a:r>
+            <a:r>
+              <a:rPr lang="tr-TR" dirty="0" err="1" smtClean="0">
+                <a:sym typeface="Wingdings" pitchFamily="2" charset="2"/>
+              </a:rPr>
+              <a:t>analysis</a:t>
+            </a:r>
+            <a:r>
+              <a:rPr lang="tr-TR" dirty="0" smtClean="0"/>
+              <a:t> </a:t>
+            </a:r>
+            <a:endParaRPr lang="tr-TR" dirty="0"/>
+          </a:p>
+        </p:txBody>
+      </p:sp>
+    </p:spTree>
+  </p:cSld>
+  <p:clrMapOvr>
+    <a:masterClrMapping/>
+  </p:clrMapOvr>
+</p:sld>
+</file>
+
+<file path=ppt/slides/slide11.xml><?xml version="1.0" encoding="utf-8"?>
+<p:sld xmlns:a="http://schemas.openxmlformats.org/drawingml/2006/main" xmlns:r="http://schemas.openxmlformats.org/officeDocument/2006/relationships" xmlns:p="http://schemas.openxmlformats.org/presentationml/2006/main">
+  <p:cSld>
+    <p:spTree>
+      <p:nvGrpSpPr>
+        <p:cNvPr id="1" name=""/>
+        <p:cNvGrpSpPr/>
+        <p:nvPr/>
+      </p:nvGrpSpPr>
+      <p:grpSpPr>
+        <a:xfrm>
+          <a:off x="0" y="0"/>
+          <a:ext cx="0" cy="0"/>
+          <a:chOff x="0" y="0"/>
+          <a:chExt cx="0" cy="0"/>
+        </a:xfrm>
+      </p:grpSpPr>
+      <p:sp>
+        <p:nvSpPr>
+          <p:cNvPr id="2" name="1 Başlık"/>
+          <p:cNvSpPr>
+            <a:spLocks noGrp="1"/>
+          </p:cNvSpPr>
+          <p:nvPr>
+            <p:ph type="title"/>
+          </p:nvPr>
+        </p:nvSpPr>
+        <p:spPr>
+          <a:xfrm>
+            <a:off x="467544" y="548680"/>
+            <a:ext cx="8229600" cy="1143000"/>
+          </a:xfrm>
+        </p:spPr>
+        <p:txBody>
+          <a:bodyPr>
+            <a:normAutofit fontScale="90000"/>
+          </a:bodyPr>
+          <a:lstStyle/>
+          <a:p>
+            <a:r>
+              <a:rPr lang="tr-TR" b="1" dirty="0" smtClean="0"/>
+              <a:t>An </a:t>
+            </a:r>
+            <a:r>
+              <a:rPr lang="tr-TR" b="1" dirty="0" err="1" smtClean="0"/>
+              <a:t>Iteration</a:t>
+            </a:r>
+            <a:r>
+              <a:rPr lang="tr-TR" b="1" dirty="0" smtClean="0"/>
+              <a:t> </a:t>
+            </a:r>
+            <a:r>
+              <a:rPr lang="tr-TR" b="1" dirty="0" err="1" smtClean="0"/>
+              <a:t>based</a:t>
+            </a:r>
+            <a:r>
+              <a:rPr lang="tr-TR" b="1" dirty="0" smtClean="0"/>
+              <a:t> </a:t>
+            </a:r>
+            <a:r>
+              <a:rPr lang="tr-TR" b="1" dirty="0" err="1" smtClean="0"/>
+              <a:t>resonance</a:t>
+            </a:r>
+            <a:r>
+              <a:rPr lang="tr-TR" b="1" dirty="0" smtClean="0"/>
+              <a:t> </a:t>
+            </a:r>
+            <a:r>
+              <a:rPr lang="tr-TR" b="1" dirty="0" err="1" smtClean="0"/>
+              <a:t>freq</a:t>
+            </a:r>
+            <a:r>
+              <a:rPr lang="tr-TR" b="1" dirty="0" smtClean="0"/>
+              <a:t>. </a:t>
+            </a:r>
+            <a:r>
+              <a:rPr lang="tr-TR" b="1" dirty="0" err="1" smtClean="0"/>
+              <a:t>Detection</a:t>
+            </a:r>
+            <a:r>
+              <a:rPr lang="tr-TR" b="1" dirty="0" smtClean="0"/>
+              <a:t> </a:t>
+            </a:r>
+            <a:r>
+              <a:rPr lang="tr-TR" b="1" dirty="0" err="1" smtClean="0"/>
+              <a:t>for</a:t>
+            </a:r>
+            <a:r>
+              <a:rPr lang="tr-TR" b="1" dirty="0" smtClean="0"/>
+              <a:t> </a:t>
+            </a:r>
+            <a:r>
+              <a:rPr lang="tr-TR" b="1" dirty="0" err="1" smtClean="0"/>
+              <a:t>Autotuning</a:t>
+            </a:r>
+            <a:r>
+              <a:rPr lang="tr-TR" b="1" dirty="0" smtClean="0"/>
+              <a:t> (</a:t>
+            </a:r>
+            <a:r>
+              <a:rPr lang="tr-TR" b="1" dirty="0" err="1" smtClean="0"/>
+              <a:t>may</a:t>
+            </a:r>
+            <a:r>
+              <a:rPr lang="tr-TR" b="1" dirty="0" smtClean="0"/>
+              <a:t> be </a:t>
+            </a:r>
+            <a:r>
+              <a:rPr lang="tr-TR" b="1" dirty="0" err="1" smtClean="0"/>
+              <a:t>summer</a:t>
+            </a:r>
+            <a:r>
+              <a:rPr lang="tr-TR" b="1" dirty="0" smtClean="0"/>
+              <a:t> </a:t>
+            </a:r>
+            <a:r>
+              <a:rPr lang="tr-TR" b="1" dirty="0" err="1" smtClean="0"/>
+              <a:t>practice</a:t>
+            </a:r>
+            <a:r>
+              <a:rPr lang="tr-TR" b="1" dirty="0" smtClean="0"/>
+              <a:t>)</a:t>
+            </a:r>
+            <a:endParaRPr lang="tr-TR" dirty="0"/>
+          </a:p>
+        </p:txBody>
+      </p:sp>
+      <p:sp>
+        <p:nvSpPr>
+          <p:cNvPr id="3" name="2 İçerik Yer Tutucusu"/>
+          <p:cNvSpPr>
+            <a:spLocks noGrp="1"/>
+          </p:cNvSpPr>
+          <p:nvPr>
+            <p:ph idx="1"/>
+          </p:nvPr>
+        </p:nvSpPr>
+        <p:spPr>
+          <a:xfrm>
+            <a:off x="457200" y="2420888"/>
+            <a:ext cx="8229600" cy="3705275"/>
+          </a:xfrm>
+        </p:spPr>
+        <p:txBody>
+          <a:bodyPr>
+            <a:normAutofit/>
+          </a:bodyPr>
+          <a:lstStyle/>
+          <a:p>
+            <a:r>
+              <a:rPr lang="tr-TR" sz="2400" dirty="0" err="1" smtClean="0"/>
+              <a:t>Aldag</a:t>
+            </a:r>
+            <a:r>
+              <a:rPr lang="tr-TR" sz="2400" dirty="0" smtClean="0"/>
+              <a:t> M., </a:t>
+            </a:r>
+            <a:r>
+              <a:rPr lang="tr-TR" sz="2400" dirty="0" err="1" smtClean="0"/>
+              <a:t>Horn</a:t>
+            </a:r>
+            <a:r>
+              <a:rPr lang="tr-TR" sz="2400" dirty="0" smtClean="0"/>
+              <a:t> J., </a:t>
+            </a:r>
+            <a:r>
+              <a:rPr lang="en-US" sz="2400" dirty="0" smtClean="0"/>
+              <a:t>Damping of resonance peaks using adaptive notch filters in gearless servo drives</a:t>
+            </a:r>
+            <a:r>
+              <a:rPr lang="tr-TR" sz="2400" dirty="0" smtClean="0"/>
+              <a:t>, MMAR 2017.</a:t>
+            </a:r>
+          </a:p>
+          <a:p>
+            <a:endParaRPr lang="tr-TR" sz="2400" dirty="0"/>
+          </a:p>
+        </p:txBody>
+      </p:sp>
+      <p:pic>
+        <p:nvPicPr>
+          <p:cNvPr id="2051" name="Picture 3"/>
+          <p:cNvPicPr>
+            <a:picLocks noChangeAspect="1" noChangeArrowheads="1"/>
+          </p:cNvPicPr>
+          <p:nvPr/>
+        </p:nvPicPr>
+        <p:blipFill>
+          <a:blip r:embed="rId2" cstate="print"/>
+          <a:srcRect/>
+          <a:stretch>
+            <a:fillRect/>
+          </a:stretch>
+        </p:blipFill>
+        <p:spPr bwMode="auto">
+          <a:xfrm>
+            <a:off x="1979712" y="3356992"/>
+            <a:ext cx="5248275" cy="3267075"/>
+          </a:xfrm>
+          <a:prstGeom prst="rect">
+            <a:avLst/>
+          </a:prstGeom>
+          <a:noFill/>
+          <a:ln w="9525">
+            <a:noFill/>
+            <a:miter lim="800000"/>
+            <a:headEnd/>
+            <a:tailEnd/>
+          </a:ln>
+        </p:spPr>
+      </p:pic>
+    </p:spTree>
+  </p:cSld>
+  <p:clrMapOvr>
+    <a:masterClrMapping/>
+  </p:clrMapOvr>
+</p:sld>
+</file>
+
+<file path=ppt/slides/slide12.xml><?xml version="1.0" encoding="utf-8"?>
 <p:sld xmlns:a="http://schemas.openxmlformats.org/drawingml/2006/main" xmlns:r="http://schemas.openxmlformats.org/officeDocument/2006/relationships" xmlns:p="http://schemas.openxmlformats.org/presentationml/2006/main">
   <p:cSld>
     <p:spTree>
@@ -3414,45 +4071,45 @@
           <a:lstStyle/>
           <a:p>
             <a:r>
-              <a:rPr lang="en-US" smtClean="0"/>
+              <a:rPr lang="en-US" dirty="0" smtClean="0"/>
               <a:t>400W single ph. </a:t>
             </a:r>
           </a:p>
           <a:p>
             <a:r>
-              <a:rPr lang="en-US" smtClean="0"/>
+              <a:rPr lang="en-US" dirty="0" smtClean="0"/>
               <a:t>750W three ph. servo </a:t>
             </a:r>
           </a:p>
           <a:p>
             <a:r>
-              <a:rPr lang="en-US" smtClean="0"/>
+              <a:rPr lang="en-US" dirty="0" smtClean="0"/>
               <a:t>1kW for next</a:t>
             </a:r>
           </a:p>
           <a:p>
-            <a:endParaRPr lang="en-US" smtClean="0"/>
-          </a:p>
-          <a:p>
-            <a:r>
-              <a:rPr lang="en-US" smtClean="0"/>
+            <a:endParaRPr lang="en-US" dirty="0" smtClean="0"/>
+          </a:p>
+          <a:p>
+            <a:r>
+              <a:rPr lang="en-US" dirty="0" smtClean="0"/>
               <a:t>Off – line </a:t>
             </a:r>
             <a:r>
-              <a:rPr lang="en-US" smtClean="0">
+              <a:rPr lang="en-US" dirty="0" smtClean="0">
                 <a:sym typeface="Wingdings" pitchFamily="2" charset="2"/>
               </a:rPr>
               <a:t> On – line tuning</a:t>
             </a:r>
           </a:p>
           <a:p>
-            <a:endParaRPr lang="en-US" smtClean="0">
+            <a:endParaRPr lang="en-US" dirty="0" smtClean="0">
               <a:sym typeface="Wingdings" pitchFamily="2" charset="2"/>
             </a:endParaRPr>
           </a:p>
           <a:p>
             <a:r>
-              <a:rPr lang="en-US" smtClean="0">
+              <a:rPr lang="en-US" dirty="0" smtClean="0">
                 <a:sym typeface="Wingdings" pitchFamily="2" charset="2"/>
               </a:rPr>
               <a:t>Pre-defined problems (mechanical)</a:t>
@@ -3461,16 +4118,28 @@
           <a:p>
             <a:pPr lvl="1"/>
             <a:r>
-              <a:rPr lang="en-US" smtClean="0">
+              <a:rPr lang="en-US" dirty="0" smtClean="0">
                 <a:sym typeface="Wingdings" pitchFamily="2" charset="2"/>
               </a:rPr>
-              <a:t>Friction compansation </a:t>
+              <a:t>Friction </a:t>
+            </a:r>
+            <a:r>
+              <a:rPr lang="en-US" dirty="0" err="1" smtClean="0">
+                <a:sym typeface="Wingdings" pitchFamily="2" charset="2"/>
+              </a:rPr>
+              <a:t>compansation</a:t>
+            </a:r>
+            <a:r>
+              <a:rPr lang="en-US" dirty="0" smtClean="0">
+                <a:sym typeface="Wingdings" pitchFamily="2" charset="2"/>
+              </a:rPr>
+              <a:t> </a:t>
             </a:r>
           </a:p>
           <a:p>
             <a:pPr lvl="1"/>
             <a:r>
-              <a:rPr lang="en-US" smtClean="0">
+              <a:rPr lang="en-US" dirty="0" smtClean="0">
                 <a:sym typeface="Wingdings" pitchFamily="2" charset="2"/>
               </a:rPr>
               <a:t>Inertia mismatch</a:t>
@@ -3479,7 +4148,7 @@
           <a:p>
             <a:pPr lvl="1"/>
             <a:r>
-              <a:rPr lang="en-US" smtClean="0">
+              <a:rPr lang="en-US" dirty="0" smtClean="0">
                 <a:sym typeface="Wingdings" pitchFamily="2" charset="2"/>
               </a:rPr>
               <a:t>Mechanical resonance, vibration suppression</a:t>
@@ -3488,21 +4157,57 @@
           <a:p>
             <a:pPr lvl="2"/>
             <a:r>
-              <a:rPr lang="en-US" smtClean="0">
+              <a:rPr lang="en-US" dirty="0" smtClean="0">
                 <a:sym typeface="Wingdings" pitchFamily="2" charset="2"/>
               </a:rPr>
-              <a:t>freq. and Amplitude for filtering?</a:t>
+              <a:t>freq. </a:t>
+            </a:r>
+            <a:r>
+              <a:rPr lang="en-US" dirty="0" smtClean="0">
+                <a:sym typeface="Wingdings" pitchFamily="2" charset="2"/>
+              </a:rPr>
+              <a:t>Amplitude</a:t>
+            </a:r>
+            <a:r>
+              <a:rPr lang="tr-TR" dirty="0" smtClean="0">
+                <a:sym typeface="Wingdings" pitchFamily="2" charset="2"/>
+              </a:rPr>
+              <a:t> </a:t>
+            </a:r>
+            <a:r>
+              <a:rPr lang="tr-TR" dirty="0" err="1" smtClean="0">
+                <a:sym typeface="Wingdings" pitchFamily="2" charset="2"/>
+              </a:rPr>
+              <a:t>and</a:t>
+            </a:r>
+            <a:r>
+              <a:rPr lang="tr-TR" dirty="0" smtClean="0">
+                <a:sym typeface="Wingdings" pitchFamily="2" charset="2"/>
+              </a:rPr>
+              <a:t> BW</a:t>
+            </a:r>
+            <a:r>
+              <a:rPr lang="en-US" dirty="0" smtClean="0">
+                <a:sym typeface="Wingdings" pitchFamily="2" charset="2"/>
+              </a:rPr>
+              <a:t> </a:t>
+            </a:r>
+            <a:r>
+              <a:rPr lang="en-US" dirty="0" smtClean="0">
+                <a:sym typeface="Wingdings" pitchFamily="2" charset="2"/>
+              </a:rPr>
+              <a:t>for filtering?</a:t>
             </a:r>
           </a:p>
           <a:p>
             <a:pPr lvl="2"/>
             <a:r>
-              <a:rPr lang="en-US" smtClean="0">
+              <a:rPr lang="en-US" dirty="0" smtClean="0">
                 <a:sym typeface="Wingdings" pitchFamily="2" charset="2"/>
               </a:rPr>
               <a:t>High – low freq. Responses?  </a:t>
             </a:r>
-            <a:endParaRPr lang="en-US" smtClean="0"/>
+            <a:endParaRPr lang="en-US" dirty="0" smtClean="0"/>
           </a:p>
         </p:txBody>
       </p:sp>
@@ -3511,6 +4216,13 @@
   <p:clrMapOvr>
     <a:masterClrMapping/>
   </p:clrMapOvr>
+  <p:timing>
+    <p:tnLst>
+      <p:par>
+        <p:cTn id="1" dur="indefinite" restart="never" nodeType="tmRoot"/>
+      </p:par>
+    </p:tnLst>
+  </p:timing>
 </p:sld>
 </file>
 
@@ -3686,6 +4398,13 @@
   <p:clrMapOvr>
     <a:masterClrMapping/>
   </p:clrMapOvr>
+  <p:timing>
+    <p:tnLst>
+      <p:par>
+        <p:cTn id="1" dur="indefinite" restart="never" nodeType="tmRoot"/>
+      </p:par>
+    </p:tnLst>
+  </p:timing>
 </p:sld>
 </file>
 
@@ -3820,6 +4539,13 @@
   <p:clrMapOvr>
     <a:masterClrMapping/>
   </p:clrMapOvr>
+  <p:timing>
+    <p:tnLst>
+      <p:par>
+        <p:cTn id="1" dur="indefinite" restart="never" nodeType="tmRoot"/>
+      </p:par>
+    </p:tnLst>
+  </p:timing>
 </p:sld>
 </file>
 
@@ -4208,6 +4934,13 @@
   <p:clrMapOvr>
     <a:masterClrMapping/>
   </p:clrMapOvr>
+  <p:timing>
+    <p:tnLst>
+      <p:par>
+        <p:cTn id="1" dur="indefinite" restart="never" nodeType="tmRoot"/>
+      </p:par>
+    </p:tnLst>
+  </p:timing>
 </p:sld>
 </file>
 
@@ -4418,11 +5151,7 @@
             </a:r>
             <a:r>
               <a:rPr lang="en-GB" sz="1900" dirty="0" smtClean="0"/>
-              <a:t> </a:t>
-            </a:r>
-            <a:r>
-              <a:rPr lang="en-GB" sz="1900" dirty="0" smtClean="0"/>
-              <a:t>Fourier </a:t>
+              <a:t> Fourier </a:t>
             </a:r>
             <a:r>
               <a:rPr lang="tr-TR" sz="1900" dirty="0" smtClean="0"/>
@@ -4434,11 +5163,7 @@
             </a:r>
             <a:r>
               <a:rPr lang="en-GB" sz="1900" dirty="0" smtClean="0"/>
-              <a:t> </a:t>
-            </a:r>
-            <a:r>
-              <a:rPr lang="en-GB" sz="1900" dirty="0" smtClean="0"/>
-              <a:t>(SDFT), </a:t>
+              <a:t> (SDFT), </a:t>
             </a:r>
             <a:r>
               <a:rPr lang="tr-TR" sz="1900" dirty="0" smtClean="0"/>
@@ -4474,11 +5199,7 @@
             </a:r>
             <a:r>
               <a:rPr lang="en-GB" sz="1900" dirty="0" smtClean="0"/>
-              <a:t> </a:t>
-            </a:r>
-            <a:r>
-              <a:rPr lang="en-GB" sz="1900" dirty="0" smtClean="0"/>
-              <a:t>(DWT), </a:t>
+              <a:t> (DWT), </a:t>
             </a:r>
             <a:r>
               <a:rPr lang="tr-TR" sz="1900" dirty="0" smtClean="0"/>
@@ -4516,7 +5237,6 @@
               <a:rPr lang="tr-TR" sz="1900" dirty="0" smtClean="0"/>
               <a:t>) </a:t>
             </a:r>
-            <a:endParaRPr lang="tr-TR" sz="1900" dirty="0" smtClean="0"/>
           </a:p>
           <a:p>
             <a:r>
@@ -4614,6 +5334,13 @@
   <p:clrMapOvr>
     <a:masterClrMapping/>
   </p:clrMapOvr>
+  <p:timing>
+    <p:tnLst>
+      <p:par>
+        <p:cTn id="1" dur="indefinite" restart="never" nodeType="tmRoot"/>
+      </p:par>
+    </p:tnLst>
+  </p:timing>
 </p:sld>
 </file>
 
@@ -4696,6 +5423,13 @@
   <p:clrMapOvr>
     <a:masterClrMapping/>
   </p:clrMapOvr>
+  <p:timing>
+    <p:tnLst>
+      <p:par>
+        <p:cTn id="1" dur="indefinite" restart="never" nodeType="tmRoot"/>
+      </p:par>
+    </p:tnLst>
+  </p:timing>
 </p:sld>
 </file>
 
@@ -4728,686 +5462,290 @@
         </p:nvSpPr>
         <p:spPr/>
         <p:txBody>
-          <a:bodyPr>
-            <a:normAutofit/>
-          </a:bodyPr>
-          <a:lstStyle/>
-          <a:p>
-            <a:r>
-              <a:rPr lang="tr-TR" sz="3200" b="1" dirty="0" smtClean="0"/>
-              <a:t>An </a:t>
-            </a:r>
-            <a:r>
-              <a:rPr lang="tr-TR" sz="3200" b="1" dirty="0" err="1" smtClean="0"/>
-              <a:t>excitation</a:t>
-            </a:r>
-            <a:r>
-              <a:rPr lang="tr-TR" sz="3200" b="1" dirty="0" smtClean="0"/>
-              <a:t> </a:t>
-            </a:r>
-            <a:r>
-              <a:rPr lang="tr-TR" sz="3200" b="1" dirty="0" err="1" smtClean="0"/>
-              <a:t>based</a:t>
-            </a:r>
-            <a:r>
-              <a:rPr lang="tr-TR" sz="3200" b="1" dirty="0" smtClean="0"/>
-              <a:t> OFF-LINE </a:t>
-            </a:r>
-            <a:r>
-              <a:rPr lang="tr-TR" sz="3200" b="1" dirty="0" err="1" smtClean="0"/>
-              <a:t>Autotuning</a:t>
-            </a:r>
-            <a:r>
-              <a:rPr lang="tr-TR" sz="3200" b="1" dirty="0" smtClean="0"/>
-              <a:t> (</a:t>
-            </a:r>
-            <a:r>
-              <a:rPr lang="tr-TR" sz="3200" b="1" dirty="0" err="1" smtClean="0"/>
-              <a:t>may</a:t>
-            </a:r>
-            <a:r>
-              <a:rPr lang="tr-TR" sz="3200" b="1" dirty="0" smtClean="0"/>
-              <a:t> be </a:t>
-            </a:r>
-            <a:r>
-              <a:rPr lang="tr-TR" sz="3200" b="1" dirty="0" err="1" smtClean="0"/>
-              <a:t>summer</a:t>
-            </a:r>
-            <a:r>
-              <a:rPr lang="tr-TR" sz="3200" b="1" dirty="0" smtClean="0"/>
-              <a:t> </a:t>
-            </a:r>
-            <a:r>
-              <a:rPr lang="tr-TR" sz="3200" b="1" dirty="0" err="1" smtClean="0"/>
-              <a:t>practice</a:t>
-            </a:r>
-            <a:r>
-              <a:rPr lang="tr-TR" sz="3200" b="1" dirty="0" smtClean="0"/>
-              <a:t>)</a:t>
-            </a:r>
-            <a:endParaRPr lang="tr-TR" sz="3200" b="1" dirty="0"/>
-          </a:p>
-        </p:txBody>
-      </p:sp>
-      <p:sp>
-        <p:nvSpPr>
-          <p:cNvPr id="3" name="2 İçerik Yer Tutucusu"/>
-          <p:cNvSpPr>
-            <a:spLocks noGrp="1"/>
-          </p:cNvSpPr>
+          <a:bodyPr/>
+          <a:lstStyle/>
+          <a:p>
+            <a:r>
+              <a:rPr lang="tr-TR" dirty="0" err="1" smtClean="0"/>
+              <a:t>Mechanical</a:t>
+            </a:r>
+            <a:r>
+              <a:rPr lang="tr-TR" dirty="0" smtClean="0"/>
+              <a:t> model</a:t>
+            </a:r>
+            <a:endParaRPr lang="tr-TR" dirty="0"/>
+          </a:p>
+        </p:txBody>
+      </p:sp>
+      <p:pic>
+        <p:nvPicPr>
+          <p:cNvPr id="1026" name="Picture 2"/>
+          <p:cNvPicPr>
+            <a:picLocks noGrp="1" noChangeAspect="1" noChangeArrowheads="1"/>
+          </p:cNvPicPr>
           <p:nvPr>
             <p:ph idx="1"/>
           </p:nvPr>
-        </p:nvSpPr>
-        <p:spPr>
+        </p:nvPicPr>
+        <p:blipFill>
+          <a:blip r:embed="rId2" cstate="print"/>
+          <a:srcRect/>
+          <a:stretch>
+            <a:fillRect/>
+          </a:stretch>
+        </p:blipFill>
+        <p:spPr bwMode="auto">
           <a:xfrm>
-            <a:off x="467544" y="1556792"/>
-            <a:ext cx="8229600" cy="1656184"/>
-          </a:xfrm>
-        </p:spPr>
-        <p:txBody>
-          <a:bodyPr>
-            <a:normAutofit/>
-          </a:bodyPr>
-          <a:lstStyle/>
-          <a:p>
-            <a:r>
-              <a:rPr lang="de-DE" sz="2800" dirty="0" smtClean="0"/>
-              <a:t>Yang S</a:t>
-            </a:r>
-            <a:r>
-              <a:rPr lang="tr-TR" sz="2800" dirty="0" smtClean="0"/>
-              <a:t>.</a:t>
-            </a:r>
-            <a:r>
-              <a:rPr lang="de-DE" sz="2800" dirty="0" smtClean="0"/>
-              <a:t>M</a:t>
-            </a:r>
-            <a:r>
-              <a:rPr lang="tr-TR" sz="2800" dirty="0" smtClean="0"/>
-              <a:t>., </a:t>
-            </a:r>
-            <a:r>
-              <a:rPr lang="de-DE" sz="2800" dirty="0" smtClean="0"/>
-              <a:t>Lin K</a:t>
-            </a:r>
-            <a:r>
-              <a:rPr lang="tr-TR" sz="2800" dirty="0" smtClean="0"/>
-              <a:t>.W., </a:t>
-            </a:r>
-            <a:r>
-              <a:rPr lang="en-US" sz="2800" dirty="0" smtClean="0"/>
-              <a:t>Automatic Control Loop Tuning for Permanent-Magnet AC Servo Motor Drives</a:t>
-            </a:r>
-            <a:r>
-              <a:rPr lang="tr-TR" sz="2800" dirty="0" smtClean="0"/>
-              <a:t>, IEEE </a:t>
-            </a:r>
-            <a:r>
-              <a:rPr lang="tr-TR" sz="2800" dirty="0" err="1" smtClean="0"/>
-              <a:t>Transactions</a:t>
-            </a:r>
-            <a:r>
-              <a:rPr lang="tr-TR" sz="2800" dirty="0" smtClean="0"/>
-              <a:t> on </a:t>
-            </a:r>
-            <a:r>
-              <a:rPr lang="tr-TR" sz="2800" dirty="0" err="1" smtClean="0"/>
-              <a:t>Industrial</a:t>
-            </a:r>
-            <a:r>
-              <a:rPr lang="tr-TR" sz="2800" dirty="0" smtClean="0"/>
-              <a:t> </a:t>
-            </a:r>
-            <a:r>
-              <a:rPr lang="tr-TR" sz="2800" dirty="0" err="1" smtClean="0"/>
-              <a:t>Electronics</a:t>
-            </a:r>
-            <a:r>
-              <a:rPr lang="tr-TR" sz="2800" dirty="0" smtClean="0"/>
-              <a:t>, 2016</a:t>
-            </a:r>
-            <a:endParaRPr lang="tr-TR" sz="2800" dirty="0"/>
-          </a:p>
-        </p:txBody>
-      </p:sp>
-      <p:sp>
-        <p:nvSpPr>
-          <p:cNvPr id="4" name="1 Başlık"/>
-          <p:cNvSpPr txBox="1">
-            <a:spLocks/>
-          </p:cNvSpPr>
-          <p:nvPr/>
-        </p:nvSpPr>
-        <p:spPr>
-          <a:xfrm>
-            <a:off x="539552" y="3798168"/>
-            <a:ext cx="8229600" cy="1143000"/>
+            <a:off x="2337023" y="1412776"/>
+            <a:ext cx="4467225" cy="1247775"/>
           </a:xfrm>
           <a:prstGeom prst="rect">
             <a:avLst/>
           </a:prstGeom>
+          <a:noFill/>
+          <a:ln w="9525">
+            <a:noFill/>
+            <a:miter lim="800000"/>
+            <a:headEnd/>
+            <a:tailEnd/>
+          </a:ln>
         </p:spPr>
-        <p:txBody>
-          <a:bodyPr vert="horz" lIns="91440" tIns="45720" rIns="91440" bIns="45720" rtlCol="0" anchor="ctr">
-            <a:normAutofit fontScale="97500"/>
-          </a:bodyPr>
-          <a:lstStyle/>
-          <a:p>
-            <a:pPr marL="0" marR="0" lvl="0" indent="0" algn="ctr" defTabSz="914400" rtl="0" eaLnBrk="1" fontAlgn="auto" latinLnBrk="0" hangingPunct="1">
-              <a:lnSpc>
-                <a:spcPct val="100000"/>
-              </a:lnSpc>
-              <a:spcBef>
-                <a:spcPct val="0"/>
-              </a:spcBef>
-              <a:spcAft>
-                <a:spcPts val="0"/>
-              </a:spcAft>
-              <a:buClrTx/>
-              <a:buSzTx/>
-              <a:buFontTx/>
-              <a:buNone/>
-              <a:tabLst/>
-              <a:defRPr/>
-            </a:pPr>
-            <a:r>
-              <a:rPr kumimoji="0" lang="tr-TR" sz="3200" b="1" i="0" u="none" strike="noStrike" kern="1200" cap="none" spc="0" normalizeH="0" baseline="0" noProof="0" dirty="0" smtClean="0">
-                <a:ln>
-                  <a:noFill/>
-                </a:ln>
-                <a:solidFill>
-                  <a:schemeClr val="tx1"/>
-                </a:solidFill>
-                <a:effectLst/>
-                <a:uLnTx/>
-                <a:uFillTx/>
-                <a:latin typeface="+mj-lt"/>
-                <a:ea typeface="+mj-ea"/>
-                <a:cs typeface="+mj-cs"/>
-              </a:rPr>
-              <a:t>A </a:t>
-            </a:r>
-            <a:r>
-              <a:rPr kumimoji="0" lang="tr-TR" sz="3200" b="1" i="0" u="none" strike="noStrike" kern="1200" cap="none" spc="0" normalizeH="0" baseline="0" noProof="0" dirty="0" err="1" smtClean="0">
-                <a:ln>
-                  <a:noFill/>
-                </a:ln>
-                <a:solidFill>
-                  <a:schemeClr val="tx1"/>
-                </a:solidFill>
-                <a:effectLst/>
-                <a:uLnTx/>
-                <a:uFillTx/>
-                <a:latin typeface="+mj-lt"/>
-                <a:ea typeface="+mj-ea"/>
-                <a:cs typeface="+mj-cs"/>
-              </a:rPr>
-              <a:t>resonance</a:t>
-            </a:r>
-            <a:r>
-              <a:rPr kumimoji="0" lang="tr-TR" sz="3200" b="1" i="0" u="none" strike="noStrike" kern="1200" cap="none" spc="0" normalizeH="0" baseline="0" noProof="0" dirty="0" smtClean="0">
-                <a:ln>
-                  <a:noFill/>
-                </a:ln>
-                <a:solidFill>
-                  <a:schemeClr val="tx1"/>
-                </a:solidFill>
-                <a:effectLst/>
-                <a:uLnTx/>
-                <a:uFillTx/>
-                <a:latin typeface="+mj-lt"/>
-                <a:ea typeface="+mj-ea"/>
-                <a:cs typeface="+mj-cs"/>
-              </a:rPr>
-              <a:t> </a:t>
-            </a:r>
-            <a:r>
-              <a:rPr kumimoji="0" lang="tr-TR" sz="3200" b="1" i="0" u="none" strike="noStrike" kern="1200" cap="none" spc="0" normalizeH="0" baseline="0" noProof="0" dirty="0" err="1" smtClean="0">
-                <a:ln>
-                  <a:noFill/>
-                </a:ln>
-                <a:solidFill>
-                  <a:schemeClr val="tx1"/>
-                </a:solidFill>
-                <a:effectLst/>
-                <a:uLnTx/>
-                <a:uFillTx/>
-                <a:latin typeface="+mj-lt"/>
-                <a:ea typeface="+mj-ea"/>
-                <a:cs typeface="+mj-cs"/>
-              </a:rPr>
-              <a:t>freq</a:t>
-            </a:r>
-            <a:r>
-              <a:rPr kumimoji="0" lang="tr-TR" sz="3200" b="1" i="0" u="none" strike="noStrike" kern="1200" cap="none" spc="0" normalizeH="0" baseline="0" noProof="0" dirty="0" smtClean="0">
-                <a:ln>
-                  <a:noFill/>
-                </a:ln>
-                <a:solidFill>
-                  <a:schemeClr val="tx1"/>
-                </a:solidFill>
-                <a:effectLst/>
-                <a:uLnTx/>
-                <a:uFillTx/>
-                <a:latin typeface="+mj-lt"/>
-                <a:ea typeface="+mj-ea"/>
-                <a:cs typeface="+mj-cs"/>
-              </a:rPr>
-              <a:t>. </a:t>
-            </a:r>
-            <a:r>
-              <a:rPr kumimoji="0" lang="tr-TR" sz="3200" b="1" i="0" u="none" strike="noStrike" kern="1200" cap="none" spc="0" normalizeH="0" baseline="0" noProof="0" dirty="0" err="1" smtClean="0">
-                <a:ln>
-                  <a:noFill/>
-                </a:ln>
-                <a:solidFill>
-                  <a:schemeClr val="tx1"/>
-                </a:solidFill>
-                <a:effectLst/>
-                <a:uLnTx/>
-                <a:uFillTx/>
-                <a:latin typeface="+mj-lt"/>
-                <a:ea typeface="+mj-ea"/>
-                <a:cs typeface="+mj-cs"/>
-              </a:rPr>
-              <a:t>Detection</a:t>
-            </a:r>
-            <a:r>
-              <a:rPr kumimoji="0" lang="tr-TR" sz="3200" b="1" i="0" u="none" strike="noStrike" kern="1200" cap="none" spc="0" normalizeH="0" baseline="0" noProof="0" dirty="0" smtClean="0">
-                <a:ln>
-                  <a:noFill/>
-                </a:ln>
-                <a:solidFill>
-                  <a:schemeClr val="tx1"/>
-                </a:solidFill>
-                <a:effectLst/>
-                <a:uLnTx/>
-                <a:uFillTx/>
-                <a:latin typeface="+mj-lt"/>
-                <a:ea typeface="+mj-ea"/>
-                <a:cs typeface="+mj-cs"/>
-              </a:rPr>
-              <a:t> </a:t>
-            </a:r>
-            <a:r>
-              <a:rPr kumimoji="0" lang="tr-TR" sz="3200" b="1" i="0" u="none" strike="noStrike" kern="1200" cap="none" spc="0" normalizeH="0" baseline="0" noProof="0" dirty="0" err="1" smtClean="0">
-                <a:ln>
-                  <a:noFill/>
-                </a:ln>
-                <a:solidFill>
-                  <a:schemeClr val="tx1"/>
-                </a:solidFill>
-                <a:effectLst/>
-                <a:uLnTx/>
-                <a:uFillTx/>
-                <a:latin typeface="+mj-lt"/>
-                <a:ea typeface="+mj-ea"/>
-                <a:cs typeface="+mj-cs"/>
-              </a:rPr>
-              <a:t>for</a:t>
-            </a:r>
-            <a:r>
-              <a:rPr kumimoji="0" lang="tr-TR" sz="3200" b="1" i="0" u="none" strike="noStrike" kern="1200" cap="none" spc="0" normalizeH="0" baseline="0" noProof="0" dirty="0" smtClean="0">
-                <a:ln>
-                  <a:noFill/>
-                </a:ln>
-                <a:solidFill>
-                  <a:schemeClr val="tx1"/>
-                </a:solidFill>
-                <a:effectLst/>
-                <a:uLnTx/>
-                <a:uFillTx/>
-                <a:latin typeface="+mj-lt"/>
-                <a:ea typeface="+mj-ea"/>
-                <a:cs typeface="+mj-cs"/>
-              </a:rPr>
-              <a:t> </a:t>
-            </a:r>
-            <a:r>
-              <a:rPr kumimoji="0" lang="tr-TR" sz="3200" b="1" i="0" u="none" strike="noStrike" kern="1200" cap="none" spc="0" normalizeH="0" baseline="0" noProof="0" dirty="0" err="1" smtClean="0">
-                <a:ln>
-                  <a:noFill/>
-                </a:ln>
-                <a:solidFill>
-                  <a:schemeClr val="tx1"/>
-                </a:solidFill>
-                <a:effectLst/>
-                <a:uLnTx/>
-                <a:uFillTx/>
-                <a:latin typeface="+mj-lt"/>
-                <a:ea typeface="+mj-ea"/>
-                <a:cs typeface="+mj-cs"/>
-              </a:rPr>
-              <a:t>Autotuning</a:t>
-            </a:r>
-            <a:r>
-              <a:rPr kumimoji="0" lang="tr-TR" sz="3200" b="1" i="0" u="none" strike="noStrike" kern="1200" cap="none" spc="0" normalizeH="0" baseline="0" noProof="0" dirty="0" smtClean="0">
-                <a:ln>
-                  <a:noFill/>
-                </a:ln>
-                <a:solidFill>
-                  <a:schemeClr val="tx1"/>
-                </a:solidFill>
-                <a:effectLst/>
-                <a:uLnTx/>
-                <a:uFillTx/>
-                <a:latin typeface="+mj-lt"/>
-                <a:ea typeface="+mj-ea"/>
-                <a:cs typeface="+mj-cs"/>
-              </a:rPr>
-              <a:t> (</a:t>
-            </a:r>
-            <a:r>
-              <a:rPr kumimoji="0" lang="tr-TR" sz="3200" b="1" i="0" u="none" strike="noStrike" kern="1200" cap="none" spc="0" normalizeH="0" baseline="0" noProof="0" dirty="0" err="1" smtClean="0">
-                <a:ln>
-                  <a:noFill/>
-                </a:ln>
-                <a:solidFill>
-                  <a:schemeClr val="tx1"/>
-                </a:solidFill>
-                <a:effectLst/>
-                <a:uLnTx/>
-                <a:uFillTx/>
-                <a:latin typeface="+mj-lt"/>
-                <a:ea typeface="+mj-ea"/>
-                <a:cs typeface="+mj-cs"/>
-              </a:rPr>
-              <a:t>may</a:t>
-            </a:r>
-            <a:r>
-              <a:rPr kumimoji="0" lang="tr-TR" sz="3200" b="1" i="0" u="none" strike="noStrike" kern="1200" cap="none" spc="0" normalizeH="0" baseline="0" noProof="0" dirty="0" smtClean="0">
-                <a:ln>
-                  <a:noFill/>
-                </a:ln>
-                <a:solidFill>
-                  <a:schemeClr val="tx1"/>
-                </a:solidFill>
-                <a:effectLst/>
-                <a:uLnTx/>
-                <a:uFillTx/>
-                <a:latin typeface="+mj-lt"/>
-                <a:ea typeface="+mj-ea"/>
-                <a:cs typeface="+mj-cs"/>
-              </a:rPr>
-              <a:t> be </a:t>
-            </a:r>
-            <a:r>
-              <a:rPr kumimoji="0" lang="tr-TR" sz="3200" b="1" i="0" u="none" strike="noStrike" kern="1200" cap="none" spc="0" normalizeH="0" baseline="0" noProof="0" dirty="0" err="1" smtClean="0">
-                <a:ln>
-                  <a:noFill/>
-                </a:ln>
-                <a:solidFill>
-                  <a:schemeClr val="tx1"/>
-                </a:solidFill>
-                <a:effectLst/>
-                <a:uLnTx/>
-                <a:uFillTx/>
-                <a:latin typeface="+mj-lt"/>
-                <a:ea typeface="+mj-ea"/>
-                <a:cs typeface="+mj-cs"/>
-              </a:rPr>
-              <a:t>summer</a:t>
-            </a:r>
-            <a:r>
-              <a:rPr kumimoji="0" lang="tr-TR" sz="3200" b="1" i="0" u="none" strike="noStrike" kern="1200" cap="none" spc="0" normalizeH="0" baseline="0" noProof="0" dirty="0" smtClean="0">
-                <a:ln>
-                  <a:noFill/>
-                </a:ln>
-                <a:solidFill>
-                  <a:schemeClr val="tx1"/>
-                </a:solidFill>
-                <a:effectLst/>
-                <a:uLnTx/>
-                <a:uFillTx/>
-                <a:latin typeface="+mj-lt"/>
-                <a:ea typeface="+mj-ea"/>
-                <a:cs typeface="+mj-cs"/>
-              </a:rPr>
-              <a:t> </a:t>
-            </a:r>
-            <a:r>
-              <a:rPr kumimoji="0" lang="tr-TR" sz="3200" b="1" i="0" u="none" strike="noStrike" kern="1200" cap="none" spc="0" normalizeH="0" baseline="0" noProof="0" dirty="0" err="1" smtClean="0">
-                <a:ln>
-                  <a:noFill/>
-                </a:ln>
-                <a:solidFill>
-                  <a:schemeClr val="tx1"/>
-                </a:solidFill>
-                <a:effectLst/>
-                <a:uLnTx/>
-                <a:uFillTx/>
-                <a:latin typeface="+mj-lt"/>
-                <a:ea typeface="+mj-ea"/>
-                <a:cs typeface="+mj-cs"/>
-              </a:rPr>
-              <a:t>practice</a:t>
-            </a:r>
-            <a:r>
-              <a:rPr kumimoji="0" lang="tr-TR" sz="3200" b="1" i="0" u="none" strike="noStrike" kern="1200" cap="none" spc="0" normalizeH="0" baseline="0" noProof="0" dirty="0" smtClean="0">
-                <a:ln>
-                  <a:noFill/>
-                </a:ln>
-                <a:solidFill>
-                  <a:schemeClr val="tx1"/>
-                </a:solidFill>
-                <a:effectLst/>
-                <a:uLnTx/>
-                <a:uFillTx/>
-                <a:latin typeface="+mj-lt"/>
-                <a:ea typeface="+mj-ea"/>
-                <a:cs typeface="+mj-cs"/>
-              </a:rPr>
-              <a:t>)</a:t>
-            </a:r>
-            <a:endParaRPr kumimoji="0" lang="tr-TR" sz="3200" b="1" i="0" u="none" strike="noStrike" kern="1200" cap="none" spc="0" normalizeH="0" baseline="0" noProof="0" dirty="0">
-              <a:ln>
-                <a:noFill/>
-              </a:ln>
-              <a:solidFill>
-                <a:schemeClr val="tx1"/>
-              </a:solidFill>
-              <a:effectLst/>
-              <a:uLnTx/>
-              <a:uFillTx/>
-              <a:latin typeface="+mj-lt"/>
-              <a:ea typeface="+mj-ea"/>
-              <a:cs typeface="+mj-cs"/>
-            </a:endParaRPr>
-          </a:p>
-        </p:txBody>
-      </p:sp>
-      <p:sp>
-        <p:nvSpPr>
-          <p:cNvPr id="5" name="2 İçerik Yer Tutucusu"/>
-          <p:cNvSpPr txBox="1">
-            <a:spLocks/>
-          </p:cNvSpPr>
+      </p:pic>
+      <p:pic>
+        <p:nvPicPr>
+          <p:cNvPr id="1027" name="Picture 3"/>
+          <p:cNvPicPr>
+            <a:picLocks noChangeAspect="1" noChangeArrowheads="1"/>
+          </p:cNvPicPr>
           <p:nvPr/>
-        </p:nvSpPr>
-        <p:spPr>
+        </p:nvPicPr>
+        <p:blipFill>
+          <a:blip r:embed="rId3" cstate="print"/>
+          <a:srcRect/>
+          <a:stretch>
+            <a:fillRect/>
+          </a:stretch>
+        </p:blipFill>
+        <p:spPr bwMode="auto">
           <a:xfrm>
-            <a:off x="619944" y="5013176"/>
-            <a:ext cx="8229600" cy="1512168"/>
+            <a:off x="2267744" y="3356992"/>
+            <a:ext cx="4524375" cy="2400300"/>
           </a:xfrm>
           <a:prstGeom prst="rect">
             <a:avLst/>
           </a:prstGeom>
+          <a:noFill/>
+          <a:ln w="9525">
+            <a:noFill/>
+            <a:miter lim="800000"/>
+            <a:headEnd/>
+            <a:tailEnd/>
+          </a:ln>
         </p:spPr>
-        <p:txBody>
-          <a:bodyPr vert="horz" lIns="91440" tIns="45720" rIns="91440" bIns="45720" rtlCol="0">
-            <a:normAutofit/>
+      </p:pic>
+      <p:sp>
+        <p:nvSpPr>
+          <p:cNvPr id="6" name="5 Metin kutusu"/>
+          <p:cNvSpPr txBox="1"/>
+          <p:nvPr/>
+        </p:nvSpPr>
+        <p:spPr>
+          <a:xfrm>
+            <a:off x="3779912" y="2852936"/>
+            <a:ext cx="1801391" cy="369332"/>
+          </a:xfrm>
+          <a:prstGeom prst="rect">
+            <a:avLst/>
+          </a:prstGeom>
+          <a:noFill/>
+        </p:spPr>
+        <p:txBody>
+          <a:bodyPr wrap="none" rtlCol="0">
+            <a:spAutoFit/>
           </a:bodyPr>
           <a:lstStyle/>
           <a:p>
-            <a:pPr marL="342900" lvl="0" indent="-342900">
-              <a:spcBef>
-                <a:spcPct val="20000"/>
-              </a:spcBef>
-              <a:buFont typeface="Arial" pitchFamily="34" charset="0"/>
-              <a:buChar char="•"/>
-            </a:pPr>
-            <a:r>
-              <a:rPr lang="de-DE" sz="2800" dirty="0" smtClean="0"/>
-              <a:t>Yang S</a:t>
-            </a:r>
-            <a:r>
-              <a:rPr lang="tr-TR" sz="2800" dirty="0" smtClean="0"/>
-              <a:t>.</a:t>
-            </a:r>
-            <a:r>
-              <a:rPr lang="de-DE" sz="2800" dirty="0" smtClean="0"/>
-              <a:t>M</a:t>
-            </a:r>
-            <a:r>
-              <a:rPr lang="tr-TR" sz="2800" dirty="0" smtClean="0"/>
-              <a:t>., </a:t>
-            </a:r>
-            <a:r>
-              <a:rPr lang="tr-TR" sz="2800" dirty="0" err="1" smtClean="0"/>
-              <a:t>Wang</a:t>
-            </a:r>
-            <a:r>
-              <a:rPr lang="tr-TR" sz="2800" dirty="0" smtClean="0"/>
-              <a:t> S., </a:t>
-            </a:r>
-            <a:r>
-              <a:rPr lang="en-US" sz="2800" dirty="0" smtClean="0"/>
-              <a:t>The detection of Resonance frequency in motion control systems</a:t>
-            </a:r>
-            <a:r>
-              <a:rPr kumimoji="0" lang="tr-TR" sz="2800" b="0" i="0" u="none" strike="noStrike" kern="1200" cap="none" spc="0" normalizeH="0" baseline="0" noProof="0" dirty="0" smtClean="0">
-                <a:ln>
-                  <a:noFill/>
-                </a:ln>
-                <a:solidFill>
-                  <a:schemeClr val="tx1"/>
-                </a:solidFill>
-                <a:effectLst/>
-                <a:uLnTx/>
-                <a:uFillTx/>
-                <a:latin typeface="+mn-lt"/>
-                <a:ea typeface="+mn-ea"/>
-                <a:cs typeface="+mn-cs"/>
-              </a:rPr>
+            <a:r>
+              <a:rPr lang="tr-TR" dirty="0" err="1" smtClean="0"/>
+              <a:t>Two</a:t>
+            </a:r>
+            <a:r>
+              <a:rPr lang="tr-TR" dirty="0" smtClean="0"/>
+              <a:t> </a:t>
+            </a:r>
+            <a:r>
+              <a:rPr lang="tr-TR" dirty="0" err="1" smtClean="0"/>
+              <a:t>mass</a:t>
+            </a:r>
+            <a:r>
+              <a:rPr lang="tr-TR" dirty="0" smtClean="0"/>
+              <a:t> </a:t>
+            </a:r>
+            <a:r>
+              <a:rPr lang="tr-TR" dirty="0" err="1" smtClean="0"/>
+              <a:t>system</a:t>
+            </a:r>
+            <a:endParaRPr lang="tr-TR" dirty="0"/>
+          </a:p>
+        </p:txBody>
+      </p:sp>
+      <p:sp>
+        <p:nvSpPr>
+          <p:cNvPr id="7" name="6 Metin kutusu"/>
+          <p:cNvSpPr txBox="1"/>
+          <p:nvPr/>
+        </p:nvSpPr>
+        <p:spPr>
+          <a:xfrm>
+            <a:off x="3203848" y="5949280"/>
+            <a:ext cx="2767040" cy="369332"/>
+          </a:xfrm>
+          <a:prstGeom prst="rect">
+            <a:avLst/>
+          </a:prstGeom>
+          <a:noFill/>
+        </p:spPr>
+        <p:txBody>
+          <a:bodyPr wrap="none" rtlCol="0">
+            <a:spAutoFit/>
+          </a:bodyPr>
+          <a:lstStyle/>
+          <a:p>
+            <a:r>
+              <a:rPr lang="tr-TR" dirty="0" err="1" smtClean="0"/>
+              <a:t>Control</a:t>
+            </a:r>
+            <a:r>
+              <a:rPr lang="tr-TR" dirty="0" smtClean="0"/>
+              <a:t> of </a:t>
+            </a:r>
+            <a:r>
+              <a:rPr lang="tr-TR" dirty="0" err="1" smtClean="0"/>
+              <a:t>two</a:t>
+            </a:r>
+            <a:r>
+              <a:rPr lang="tr-TR" dirty="0" smtClean="0"/>
+              <a:t> </a:t>
+            </a:r>
+            <a:r>
+              <a:rPr lang="tr-TR" dirty="0" err="1" smtClean="0"/>
+              <a:t>mass</a:t>
+            </a:r>
+            <a:r>
+              <a:rPr lang="tr-TR" dirty="0" smtClean="0"/>
+              <a:t> </a:t>
+            </a:r>
+            <a:r>
+              <a:rPr lang="tr-TR" dirty="0" err="1" smtClean="0"/>
+              <a:t>system</a:t>
+            </a:r>
+            <a:endParaRPr lang="tr-TR" dirty="0"/>
+          </a:p>
+        </p:txBody>
+      </p:sp>
+      <p:sp>
+        <p:nvSpPr>
+          <p:cNvPr id="8" name="7 Metin kutusu"/>
+          <p:cNvSpPr txBox="1"/>
+          <p:nvPr/>
+        </p:nvSpPr>
+        <p:spPr>
+          <a:xfrm>
+            <a:off x="0" y="6396335"/>
+            <a:ext cx="9144001" cy="461665"/>
+          </a:xfrm>
+          <a:prstGeom prst="rect">
+            <a:avLst/>
+          </a:prstGeom>
+          <a:noFill/>
+        </p:spPr>
+        <p:txBody>
+          <a:bodyPr wrap="square" rtlCol="0">
+            <a:spAutoFit/>
+          </a:bodyPr>
+          <a:lstStyle/>
+          <a:p>
+            <a:r>
+              <a:rPr lang="tr-TR" sz="1200" dirty="0" err="1" smtClean="0"/>
+              <a:t>See</a:t>
+            </a:r>
+            <a:r>
+              <a:rPr lang="tr-TR" sz="1200" dirty="0" smtClean="0"/>
+              <a:t> : </a:t>
+            </a:r>
+            <a:r>
+              <a:rPr lang="tr-TR" sz="1200" dirty="0" err="1" smtClean="0"/>
+              <a:t>Chen</a:t>
+            </a:r>
+            <a:r>
+              <a:rPr lang="tr-TR" sz="1200" dirty="0" smtClean="0"/>
+              <a:t> Y., </a:t>
+            </a:r>
+            <a:r>
+              <a:rPr lang="tr-TR" sz="1200" dirty="0" err="1" smtClean="0"/>
+              <a:t>Yang</a:t>
+            </a:r>
+            <a:r>
+              <a:rPr lang="tr-TR" sz="1200" dirty="0" smtClean="0"/>
+              <a:t> M., </a:t>
+            </a:r>
+            <a:r>
+              <a:rPr lang="tr-TR" sz="1200" dirty="0" err="1" smtClean="0"/>
+              <a:t>Long</a:t>
+            </a:r>
+            <a:r>
+              <a:rPr lang="tr-TR" sz="1200" dirty="0" smtClean="0"/>
+              <a:t> J., Hu K., </a:t>
+            </a:r>
+            <a:r>
+              <a:rPr lang="tr-TR" sz="1200" dirty="0" err="1" smtClean="0"/>
+              <a:t>Xu</a:t>
+            </a:r>
+            <a:r>
+              <a:rPr lang="tr-TR" sz="1200" dirty="0" smtClean="0"/>
+              <a:t> D., </a:t>
+            </a:r>
+            <a:r>
+              <a:rPr lang="tr-TR" sz="1200" dirty="0" err="1" smtClean="0"/>
+              <a:t>Blaabjerg</a:t>
+            </a:r>
+            <a:r>
+              <a:rPr lang="tr-TR" sz="1200" dirty="0" smtClean="0"/>
+              <a:t> F., </a:t>
+            </a:r>
+            <a:r>
+              <a:rPr lang="en-US" sz="1200" dirty="0" smtClean="0"/>
+              <a:t>Analysis of Oscillation Frequency Deviation in Elastic Coupling Digital Drive System and Robust Notch Filter Strategy</a:t>
+            </a:r>
+            <a:r>
+              <a:rPr lang="tr-TR" sz="1200" dirty="0" smtClean="0"/>
               <a:t>, IEEE </a:t>
             </a:r>
             <a:r>
-              <a:rPr kumimoji="0" lang="tr-TR" sz="2800" b="0" i="0" u="none" strike="noStrike" kern="1200" cap="none" spc="0" normalizeH="0" baseline="0" noProof="0" dirty="0" err="1" smtClean="0">
-                <a:ln>
-                  <a:noFill/>
-                </a:ln>
-                <a:solidFill>
-                  <a:schemeClr val="tx1"/>
-                </a:solidFill>
-                <a:effectLst/>
-                <a:uLnTx/>
-                <a:uFillTx/>
-                <a:latin typeface="+mn-lt"/>
-                <a:ea typeface="+mn-ea"/>
-                <a:cs typeface="+mn-cs"/>
-              </a:rPr>
+              <a:rPr lang="tr-TR" sz="1200" dirty="0" err="1" smtClean="0"/>
               <a:t>Transactions</a:t>
             </a:r>
             <a:r>
-              <a:rPr kumimoji="0" lang="tr-TR" sz="2800" b="0" i="0" u="none" strike="noStrike" kern="1200" cap="none" spc="0" normalizeH="0" baseline="0" noProof="0" dirty="0" smtClean="0">
-                <a:ln>
-                  <a:noFill/>
-                </a:ln>
-                <a:solidFill>
-                  <a:schemeClr val="tx1"/>
-                </a:solidFill>
-                <a:effectLst/>
-                <a:uLnTx/>
-                <a:uFillTx/>
-                <a:latin typeface="+mn-lt"/>
-                <a:ea typeface="+mn-ea"/>
-                <a:cs typeface="+mn-cs"/>
-              </a:rPr>
+              <a:rPr lang="tr-TR" sz="1200" dirty="0" smtClean="0"/>
               <a:t> on </a:t>
             </a:r>
             <a:r>
-              <a:rPr kumimoji="0" lang="tr-TR" sz="2800" b="0" i="0" u="none" strike="noStrike" kern="1200" cap="none" spc="0" normalizeH="0" baseline="0" noProof="0" dirty="0" err="1" smtClean="0">
-                <a:ln>
-                  <a:noFill/>
-                </a:ln>
-                <a:solidFill>
-                  <a:schemeClr val="tx1"/>
-                </a:solidFill>
-                <a:effectLst/>
-                <a:uLnTx/>
-                <a:uFillTx/>
-                <a:latin typeface="+mn-lt"/>
-                <a:ea typeface="+mn-ea"/>
-                <a:cs typeface="+mn-cs"/>
-              </a:rPr>
-              <a:t>Industry</a:t>
-            </a:r>
-            <a:r>
-              <a:rPr kumimoji="0" lang="tr-TR" sz="2800" b="0" i="0" u="none" strike="noStrike" kern="1200" cap="none" spc="0" normalizeH="0" noProof="0" dirty="0" smtClean="0">
-                <a:ln>
-                  <a:noFill/>
-                </a:ln>
-                <a:solidFill>
-                  <a:schemeClr val="tx1"/>
-                </a:solidFill>
-                <a:effectLst/>
-                <a:uLnTx/>
-                <a:uFillTx/>
-                <a:latin typeface="+mn-lt"/>
-                <a:ea typeface="+mn-ea"/>
-                <a:cs typeface="+mn-cs"/>
-              </a:rPr>
-              <a:t> </a:t>
-            </a:r>
-            <a:r>
-              <a:rPr kumimoji="0" lang="tr-TR" sz="2800" b="0" i="0" u="none" strike="noStrike" kern="1200" cap="none" spc="0" normalizeH="0" noProof="0" dirty="0" err="1" smtClean="0">
-                <a:ln>
-                  <a:noFill/>
-                </a:ln>
-                <a:solidFill>
-                  <a:schemeClr val="tx1"/>
-                </a:solidFill>
-                <a:effectLst/>
-                <a:uLnTx/>
-                <a:uFillTx/>
-                <a:latin typeface="+mn-lt"/>
-                <a:ea typeface="+mn-ea"/>
-                <a:cs typeface="+mn-cs"/>
-              </a:rPr>
-              <a:t>Applications</a:t>
-            </a:r>
-            <a:r>
-              <a:rPr kumimoji="0" lang="tr-TR" sz="2800" b="0" i="0" u="none" strike="noStrike" kern="1200" cap="none" spc="0" normalizeH="0" baseline="0" noProof="0" dirty="0" smtClean="0">
-                <a:ln>
-                  <a:noFill/>
-                </a:ln>
-                <a:solidFill>
-                  <a:schemeClr val="tx1"/>
-                </a:solidFill>
-                <a:effectLst/>
-                <a:uLnTx/>
-                <a:uFillTx/>
-                <a:latin typeface="+mn-lt"/>
-                <a:ea typeface="+mn-ea"/>
-                <a:cs typeface="+mn-cs"/>
-              </a:rPr>
-              <a:t>, 2014</a:t>
-            </a:r>
-            <a:endParaRPr kumimoji="0" lang="tr-TR" sz="2800" b="0" i="0" u="none" strike="noStrike" kern="1200" cap="none" spc="0" normalizeH="0" baseline="0" noProof="0" dirty="0">
-              <a:ln>
-                <a:noFill/>
-              </a:ln>
-              <a:solidFill>
-                <a:schemeClr val="tx1"/>
-              </a:solidFill>
-              <a:effectLst/>
-              <a:uLnTx/>
-              <a:uFillTx/>
-              <a:latin typeface="+mn-lt"/>
-              <a:ea typeface="+mn-ea"/>
-              <a:cs typeface="+mn-cs"/>
-            </a:endParaRPr>
+              <a:rPr lang="tr-TR" sz="1200" dirty="0" err="1" smtClean="0"/>
+              <a:t>Industrial</a:t>
+            </a:r>
+            <a:r>
+              <a:rPr lang="tr-TR" sz="1200" dirty="0" smtClean="0"/>
+              <a:t> </a:t>
+            </a:r>
+            <a:r>
+              <a:rPr lang="tr-TR" sz="1200" dirty="0" err="1" smtClean="0"/>
+              <a:t>Electronics</a:t>
+            </a:r>
+            <a:r>
+              <a:rPr lang="tr-TR" sz="1200" dirty="0" smtClean="0"/>
+              <a:t>, 2019</a:t>
+            </a:r>
+            <a:endParaRPr lang="tr-TR" sz="1200" dirty="0"/>
           </a:p>
         </p:txBody>
       </p:sp>
@@ -5446,397 +5784,688 @@
             <p:ph type="title"/>
           </p:nvPr>
         </p:nvSpPr>
+        <p:spPr/>
+        <p:txBody>
+          <a:bodyPr>
+            <a:normAutofit/>
+          </a:bodyPr>
+          <a:lstStyle/>
+          <a:p>
+            <a:r>
+              <a:rPr lang="tr-TR" sz="3200" b="1" dirty="0" smtClean="0"/>
+              <a:t>An </a:t>
+            </a:r>
+            <a:r>
+              <a:rPr lang="tr-TR" sz="3200" b="1" dirty="0" err="1" smtClean="0"/>
+              <a:t>excitation</a:t>
+            </a:r>
+            <a:r>
+              <a:rPr lang="tr-TR" sz="3200" b="1" dirty="0" smtClean="0"/>
+              <a:t> </a:t>
+            </a:r>
+            <a:r>
+              <a:rPr lang="tr-TR" sz="3200" b="1" dirty="0" err="1" smtClean="0"/>
+              <a:t>based</a:t>
+            </a:r>
+            <a:r>
+              <a:rPr lang="tr-TR" sz="3200" b="1" dirty="0" smtClean="0"/>
+              <a:t> OFF-LINE </a:t>
+            </a:r>
+            <a:r>
+              <a:rPr lang="tr-TR" sz="3200" b="1" dirty="0" err="1" smtClean="0"/>
+              <a:t>Autotuning</a:t>
+            </a:r>
+            <a:r>
+              <a:rPr lang="tr-TR" sz="3200" b="1" dirty="0" smtClean="0"/>
+              <a:t> (</a:t>
+            </a:r>
+            <a:r>
+              <a:rPr lang="tr-TR" sz="3200" b="1" dirty="0" err="1" smtClean="0"/>
+              <a:t>may</a:t>
+            </a:r>
+            <a:r>
+              <a:rPr lang="tr-TR" sz="3200" b="1" dirty="0" smtClean="0"/>
+              <a:t> be </a:t>
+            </a:r>
+            <a:r>
+              <a:rPr lang="tr-TR" sz="3200" b="1" dirty="0" err="1" smtClean="0"/>
+              <a:t>summer</a:t>
+            </a:r>
+            <a:r>
+              <a:rPr lang="tr-TR" sz="3200" b="1" dirty="0" smtClean="0"/>
+              <a:t> </a:t>
+            </a:r>
+            <a:r>
+              <a:rPr lang="tr-TR" sz="3200" b="1" dirty="0" err="1" smtClean="0"/>
+              <a:t>practice</a:t>
+            </a:r>
+            <a:r>
+              <a:rPr lang="tr-TR" sz="3200" b="1" dirty="0" smtClean="0"/>
+              <a:t>)</a:t>
+            </a:r>
+            <a:endParaRPr lang="tr-TR" sz="3200" b="1" dirty="0"/>
+          </a:p>
+        </p:txBody>
+      </p:sp>
+      <p:sp>
+        <p:nvSpPr>
+          <p:cNvPr id="3" name="2 İçerik Yer Tutucusu"/>
+          <p:cNvSpPr>
+            <a:spLocks noGrp="1"/>
+          </p:cNvSpPr>
+          <p:nvPr>
+            <p:ph idx="1"/>
+          </p:nvPr>
+        </p:nvSpPr>
         <p:spPr>
           <a:xfrm>
-            <a:off x="457200" y="274638"/>
-            <a:ext cx="8229600" cy="2074242"/>
+            <a:off x="467544" y="1556792"/>
+            <a:ext cx="8229600" cy="1656184"/>
           </a:xfrm>
         </p:spPr>
         <p:txBody>
           <a:bodyPr>
-            <a:normAutofit fontScale="90000"/>
+            <a:normAutofit/>
           </a:bodyPr>
           <a:lstStyle/>
           <a:p>
-            <a:pPr lvl="0">
+            <a:r>
+              <a:rPr lang="de-DE" sz="2800" dirty="0" smtClean="0"/>
+              <a:t>Yang S</a:t>
+            </a:r>
+            <a:r>
+              <a:rPr lang="tr-TR" sz="2800" dirty="0" smtClean="0"/>
+              <a:t>.</a:t>
+            </a:r>
+            <a:r>
+              <a:rPr lang="de-DE" sz="2800" dirty="0" smtClean="0"/>
+              <a:t>M</a:t>
+            </a:r>
+            <a:r>
+              <a:rPr lang="tr-TR" sz="2800" dirty="0" smtClean="0"/>
+              <a:t>., </a:t>
+            </a:r>
+            <a:r>
+              <a:rPr lang="de-DE" sz="2800" dirty="0" smtClean="0"/>
+              <a:t>Lin K</a:t>
+            </a:r>
+            <a:r>
+              <a:rPr lang="tr-TR" sz="2800" dirty="0" smtClean="0"/>
+              <a:t>.W., </a:t>
+            </a:r>
+            <a:r>
+              <a:rPr lang="en-US" sz="2800" dirty="0" smtClean="0"/>
+              <a:t>Automatic Control Loop Tuning for Permanent-Magnet AC Servo Motor Drives</a:t>
+            </a:r>
+            <a:r>
+              <a:rPr lang="tr-TR" sz="2800" dirty="0" smtClean="0"/>
+              <a:t>, IEEE </a:t>
+            </a:r>
+            <a:r>
+              <a:rPr lang="tr-TR" sz="2800" dirty="0" err="1" smtClean="0"/>
+              <a:t>Transactions</a:t>
+            </a:r>
+            <a:r>
+              <a:rPr lang="tr-TR" sz="2800" dirty="0" smtClean="0"/>
+              <a:t> on </a:t>
+            </a:r>
+            <a:r>
+              <a:rPr lang="tr-TR" sz="2800" dirty="0" err="1" smtClean="0"/>
+              <a:t>Industrial</a:t>
+            </a:r>
+            <a:r>
+              <a:rPr lang="tr-TR" sz="2800" dirty="0" smtClean="0"/>
+              <a:t> </a:t>
+            </a:r>
+            <a:r>
+              <a:rPr lang="tr-TR" sz="2800" dirty="0" err="1" smtClean="0"/>
+              <a:t>Electronics</a:t>
+            </a:r>
+            <a:r>
+              <a:rPr lang="tr-TR" sz="2800" dirty="0" smtClean="0"/>
+              <a:t>, 2016</a:t>
+            </a:r>
+            <a:endParaRPr lang="tr-TR" sz="2800" dirty="0"/>
+          </a:p>
+        </p:txBody>
+      </p:sp>
+      <p:sp>
+        <p:nvSpPr>
+          <p:cNvPr id="4" name="1 Başlık"/>
+          <p:cNvSpPr txBox="1">
+            <a:spLocks/>
+          </p:cNvSpPr>
+          <p:nvPr/>
+        </p:nvSpPr>
+        <p:spPr>
+          <a:xfrm>
+            <a:off x="539552" y="3798168"/>
+            <a:ext cx="8229600" cy="1143000"/>
+          </a:xfrm>
+          <a:prstGeom prst="rect">
+            <a:avLst/>
+          </a:prstGeom>
+        </p:spPr>
+        <p:txBody>
+          <a:bodyPr vert="horz" lIns="91440" tIns="45720" rIns="91440" bIns="45720" rtlCol="0" anchor="ctr">
+            <a:normAutofit fontScale="97500"/>
+          </a:bodyPr>
+          <a:lstStyle/>
+          <a:p>
+            <a:pPr marL="0" marR="0" lvl="0" indent="0" algn="ctr" defTabSz="914400" rtl="0" eaLnBrk="1" fontAlgn="auto" latinLnBrk="0" hangingPunct="1">
+              <a:lnSpc>
+                <a:spcPct val="100000"/>
+              </a:lnSpc>
+              <a:spcBef>
+                <a:spcPct val="0"/>
+              </a:spcBef>
+              <a:spcAft>
+                <a:spcPts val="0"/>
+              </a:spcAft>
+              <a:buClrTx/>
+              <a:buSzTx/>
+              <a:buFontTx/>
+              <a:buNone/>
+              <a:tabLst/>
               <a:defRPr/>
             </a:pPr>
             <a:r>
-              <a:rPr lang="tr-TR" b="1" dirty="0" smtClean="0"/>
-              <a:t>A FFT </a:t>
-            </a:r>
-            <a:r>
-              <a:rPr lang="tr-TR" b="1" dirty="0" err="1" smtClean="0"/>
-              <a:t>based</a:t>
-            </a:r>
-            <a:r>
-              <a:rPr lang="tr-TR" b="1" dirty="0" smtClean="0"/>
-              <a:t> </a:t>
-            </a:r>
-            <a:r>
-              <a:rPr lang="tr-TR" b="1" dirty="0" err="1" smtClean="0"/>
+              <a:rPr kumimoji="0" lang="tr-TR" sz="3200" b="1" i="0" u="none" strike="noStrike" kern="1200" cap="none" spc="0" normalizeH="0" baseline="0" noProof="0" dirty="0" smtClean="0">
+                <a:ln>
+                  <a:noFill/>
+                </a:ln>
+                <a:solidFill>
+                  <a:schemeClr val="tx1"/>
+                </a:solidFill>
+                <a:effectLst/>
+                <a:uLnTx/>
+                <a:uFillTx/>
+                <a:latin typeface="+mj-lt"/>
+                <a:ea typeface="+mj-ea"/>
+                <a:cs typeface="+mj-cs"/>
+              </a:rPr>
+              <a:t>A </a:t>
+            </a:r>
+            <a:r>
+              <a:rPr kumimoji="0" lang="tr-TR" sz="3200" b="1" i="0" u="none" strike="noStrike" kern="1200" cap="none" spc="0" normalizeH="0" baseline="0" noProof="0" dirty="0" err="1" smtClean="0">
+                <a:ln>
+                  <a:noFill/>
+                </a:ln>
+                <a:solidFill>
+                  <a:schemeClr val="tx1"/>
+                </a:solidFill>
+                <a:effectLst/>
+                <a:uLnTx/>
+                <a:uFillTx/>
+                <a:latin typeface="+mj-lt"/>
+                <a:ea typeface="+mj-ea"/>
+                <a:cs typeface="+mj-cs"/>
+              </a:rPr>
               <a:t>resonance</a:t>
             </a:r>
             <a:r>
-              <a:rPr lang="tr-TR" b="1" dirty="0" smtClean="0"/>
-              <a:t> </a:t>
-            </a:r>
-            <a:r>
-              <a:rPr lang="tr-TR" b="1" dirty="0" err="1" smtClean="0"/>
+              <a:rPr kumimoji="0" lang="tr-TR" sz="3200" b="1" i="0" u="none" strike="noStrike" kern="1200" cap="none" spc="0" normalizeH="0" baseline="0" noProof="0" dirty="0" smtClean="0">
+                <a:ln>
+                  <a:noFill/>
+                </a:ln>
+                <a:solidFill>
+                  <a:schemeClr val="tx1"/>
+                </a:solidFill>
+                <a:effectLst/>
+                <a:uLnTx/>
+                <a:uFillTx/>
+                <a:latin typeface="+mj-lt"/>
+                <a:ea typeface="+mj-ea"/>
+                <a:cs typeface="+mj-cs"/>
+              </a:rPr>
+              <a:t> </a:t>
+            </a:r>
+            <a:r>
+              <a:rPr kumimoji="0" lang="tr-TR" sz="3200" b="1" i="0" u="none" strike="noStrike" kern="1200" cap="none" spc="0" normalizeH="0" baseline="0" noProof="0" dirty="0" err="1" smtClean="0">
+                <a:ln>
+                  <a:noFill/>
+                </a:ln>
+                <a:solidFill>
+                  <a:schemeClr val="tx1"/>
+                </a:solidFill>
+                <a:effectLst/>
+                <a:uLnTx/>
+                <a:uFillTx/>
+                <a:latin typeface="+mj-lt"/>
+                <a:ea typeface="+mj-ea"/>
+                <a:cs typeface="+mj-cs"/>
+              </a:rPr>
               <a:t>freq</a:t>
             </a:r>
             <a:r>
-              <a:rPr lang="tr-TR" b="1" dirty="0" smtClean="0"/>
+              <a:rPr kumimoji="0" lang="tr-TR" sz="3200" b="1" i="0" u="none" strike="noStrike" kern="1200" cap="none" spc="0" normalizeH="0" baseline="0" noProof="0" dirty="0" smtClean="0">
+                <a:ln>
+                  <a:noFill/>
+                </a:ln>
+                <a:solidFill>
+                  <a:schemeClr val="tx1"/>
+                </a:solidFill>
+                <a:effectLst/>
+                <a:uLnTx/>
+                <a:uFillTx/>
+                <a:latin typeface="+mj-lt"/>
+                <a:ea typeface="+mj-ea"/>
+                <a:cs typeface="+mj-cs"/>
+              </a:rPr>
               <a:t>. </a:t>
             </a:r>
             <a:r>
-              <a:rPr lang="tr-TR" b="1" dirty="0" err="1" smtClean="0"/>
+              <a:rPr kumimoji="0" lang="tr-TR" sz="3200" b="1" i="0" u="none" strike="noStrike" kern="1200" cap="none" spc="0" normalizeH="0" baseline="0" noProof="0" dirty="0" err="1" smtClean="0">
+                <a:ln>
+                  <a:noFill/>
+                </a:ln>
+                <a:solidFill>
+                  <a:schemeClr val="tx1"/>
+                </a:solidFill>
+                <a:effectLst/>
+                <a:uLnTx/>
+                <a:uFillTx/>
+                <a:latin typeface="+mj-lt"/>
+                <a:ea typeface="+mj-ea"/>
+                <a:cs typeface="+mj-cs"/>
+              </a:rPr>
               <a:t>Detection</a:t>
             </a:r>
             <a:r>
-              <a:rPr lang="tr-TR" b="1" dirty="0" smtClean="0"/>
-              <a:t> </a:t>
-            </a:r>
-            <a:r>
-              <a:rPr lang="tr-TR" b="1" dirty="0" err="1" smtClean="0"/>
+              <a:rPr kumimoji="0" lang="tr-TR" sz="3200" b="1" i="0" u="none" strike="noStrike" kern="1200" cap="none" spc="0" normalizeH="0" baseline="0" noProof="0" dirty="0" smtClean="0">
+                <a:ln>
+                  <a:noFill/>
+                </a:ln>
+                <a:solidFill>
+                  <a:schemeClr val="tx1"/>
+                </a:solidFill>
+                <a:effectLst/>
+                <a:uLnTx/>
+                <a:uFillTx/>
+                <a:latin typeface="+mj-lt"/>
+                <a:ea typeface="+mj-ea"/>
+                <a:cs typeface="+mj-cs"/>
+              </a:rPr>
+              <a:t> </a:t>
+            </a:r>
+            <a:r>
+              <a:rPr kumimoji="0" lang="tr-TR" sz="3200" b="1" i="0" u="none" strike="noStrike" kern="1200" cap="none" spc="0" normalizeH="0" baseline="0" noProof="0" dirty="0" err="1" smtClean="0">
+                <a:ln>
+                  <a:noFill/>
+                </a:ln>
+                <a:solidFill>
+                  <a:schemeClr val="tx1"/>
+                </a:solidFill>
+                <a:effectLst/>
+                <a:uLnTx/>
+                <a:uFillTx/>
+                <a:latin typeface="+mj-lt"/>
+                <a:ea typeface="+mj-ea"/>
+                <a:cs typeface="+mj-cs"/>
+              </a:rPr>
               <a:t>for</a:t>
             </a:r>
             <a:r>
-              <a:rPr lang="tr-TR" b="1" dirty="0" smtClean="0"/>
-              <a:t> </a:t>
-            </a:r>
-            <a:r>
-              <a:rPr lang="tr-TR" b="1" dirty="0" err="1" smtClean="0"/>
+              <a:rPr kumimoji="0" lang="tr-TR" sz="3200" b="1" i="0" u="none" strike="noStrike" kern="1200" cap="none" spc="0" normalizeH="0" baseline="0" noProof="0" dirty="0" smtClean="0">
+                <a:ln>
+                  <a:noFill/>
+                </a:ln>
+                <a:solidFill>
+                  <a:schemeClr val="tx1"/>
+                </a:solidFill>
+                <a:effectLst/>
+                <a:uLnTx/>
+                <a:uFillTx/>
+                <a:latin typeface="+mj-lt"/>
+                <a:ea typeface="+mj-ea"/>
+                <a:cs typeface="+mj-cs"/>
+              </a:rPr>
+              <a:t> </a:t>
+            </a:r>
+            <a:r>
+              <a:rPr kumimoji="0" lang="tr-TR" sz="3200" b="1" i="0" u="none" strike="noStrike" kern="1200" cap="none" spc="0" normalizeH="0" baseline="0" noProof="0" dirty="0" err="1" smtClean="0">
+                <a:ln>
+                  <a:noFill/>
+                </a:ln>
+                <a:solidFill>
+                  <a:schemeClr val="tx1"/>
+                </a:solidFill>
+                <a:effectLst/>
+                <a:uLnTx/>
+                <a:uFillTx/>
+                <a:latin typeface="+mj-lt"/>
+                <a:ea typeface="+mj-ea"/>
+                <a:cs typeface="+mj-cs"/>
+              </a:rPr>
               <a:t>Autotuning</a:t>
             </a:r>
             <a:r>
-              <a:rPr lang="tr-TR" b="1" dirty="0" smtClean="0"/>
+              <a:rPr kumimoji="0" lang="tr-TR" sz="3200" b="1" i="0" u="none" strike="noStrike" kern="1200" cap="none" spc="0" normalizeH="0" baseline="0" noProof="0" dirty="0" smtClean="0">
+                <a:ln>
+                  <a:noFill/>
+                </a:ln>
+                <a:solidFill>
+                  <a:schemeClr val="tx1"/>
+                </a:solidFill>
+                <a:effectLst/>
+                <a:uLnTx/>
+                <a:uFillTx/>
+                <a:latin typeface="+mj-lt"/>
+                <a:ea typeface="+mj-ea"/>
+                <a:cs typeface="+mj-cs"/>
+              </a:rPr>
               <a:t> (</a:t>
             </a:r>
             <a:r>
-              <a:rPr lang="tr-TR" b="1" dirty="0" err="1" smtClean="0"/>
+              <a:rPr kumimoji="0" lang="tr-TR" sz="3200" b="1" i="0" u="none" strike="noStrike" kern="1200" cap="none" spc="0" normalizeH="0" baseline="0" noProof="0" dirty="0" err="1" smtClean="0">
+                <a:ln>
+                  <a:noFill/>
+                </a:ln>
+                <a:solidFill>
+                  <a:schemeClr val="tx1"/>
+                </a:solidFill>
+                <a:effectLst/>
+                <a:uLnTx/>
+                <a:uFillTx/>
+                <a:latin typeface="+mj-lt"/>
+                <a:ea typeface="+mj-ea"/>
+                <a:cs typeface="+mj-cs"/>
+              </a:rPr>
               <a:t>may</a:t>
             </a:r>
             <a:r>
-              <a:rPr lang="tr-TR" b="1" dirty="0" smtClean="0"/>
+              <a:rPr kumimoji="0" lang="tr-TR" sz="3200" b="1" i="0" u="none" strike="noStrike" kern="1200" cap="none" spc="0" normalizeH="0" baseline="0" noProof="0" dirty="0" smtClean="0">
+                <a:ln>
+                  <a:noFill/>
+                </a:ln>
+                <a:solidFill>
+                  <a:schemeClr val="tx1"/>
+                </a:solidFill>
+                <a:effectLst/>
+                <a:uLnTx/>
+                <a:uFillTx/>
+                <a:latin typeface="+mj-lt"/>
+                <a:ea typeface="+mj-ea"/>
+                <a:cs typeface="+mj-cs"/>
+              </a:rPr>
               <a:t> be </a:t>
             </a:r>
             <a:r>
-              <a:rPr lang="tr-TR" b="1" dirty="0" err="1" smtClean="0"/>
+              <a:rPr kumimoji="0" lang="tr-TR" sz="3200" b="1" i="0" u="none" strike="noStrike" kern="1200" cap="none" spc="0" normalizeH="0" baseline="0" noProof="0" dirty="0" err="1" smtClean="0">
+                <a:ln>
+                  <a:noFill/>
+                </a:ln>
+                <a:solidFill>
+                  <a:schemeClr val="tx1"/>
+                </a:solidFill>
+                <a:effectLst/>
+                <a:uLnTx/>
+                <a:uFillTx/>
+                <a:latin typeface="+mj-lt"/>
+                <a:ea typeface="+mj-ea"/>
+                <a:cs typeface="+mj-cs"/>
+              </a:rPr>
               <a:t>summer</a:t>
             </a:r>
             <a:r>
-              <a:rPr lang="tr-TR" b="1" dirty="0" smtClean="0"/>
-              <a:t> </a:t>
-            </a:r>
-            <a:r>
-              <a:rPr lang="tr-TR" b="1" dirty="0" err="1" smtClean="0"/>
+              <a:rPr kumimoji="0" lang="tr-TR" sz="3200" b="1" i="0" u="none" strike="noStrike" kern="1200" cap="none" spc="0" normalizeH="0" baseline="0" noProof="0" dirty="0" smtClean="0">
+                <a:ln>
+                  <a:noFill/>
+                </a:ln>
+                <a:solidFill>
+                  <a:schemeClr val="tx1"/>
+                </a:solidFill>
+                <a:effectLst/>
+                <a:uLnTx/>
+                <a:uFillTx/>
+                <a:latin typeface="+mj-lt"/>
+                <a:ea typeface="+mj-ea"/>
+                <a:cs typeface="+mj-cs"/>
+              </a:rPr>
+              <a:t> </a:t>
+            </a:r>
+            <a:r>
+              <a:rPr kumimoji="0" lang="tr-TR" sz="3200" b="1" i="0" u="none" strike="noStrike" kern="1200" cap="none" spc="0" normalizeH="0" baseline="0" noProof="0" dirty="0" err="1" smtClean="0">
+                <a:ln>
+                  <a:noFill/>
+                </a:ln>
+                <a:solidFill>
+                  <a:schemeClr val="tx1"/>
+                </a:solidFill>
+                <a:effectLst/>
+                <a:uLnTx/>
+                <a:uFillTx/>
+                <a:latin typeface="+mj-lt"/>
+                <a:ea typeface="+mj-ea"/>
+                <a:cs typeface="+mj-cs"/>
+              </a:rPr>
               <a:t>practice</a:t>
             </a:r>
             <a:r>
-              <a:rPr lang="tr-TR" b="1" dirty="0" smtClean="0"/>
+              <a:rPr kumimoji="0" lang="tr-TR" sz="3200" b="1" i="0" u="none" strike="noStrike" kern="1200" cap="none" spc="0" normalizeH="0" baseline="0" noProof="0" dirty="0" smtClean="0">
+                <a:ln>
+                  <a:noFill/>
+                </a:ln>
+                <a:solidFill>
+                  <a:schemeClr val="tx1"/>
+                </a:solidFill>
+                <a:effectLst/>
+                <a:uLnTx/>
+                <a:uFillTx/>
+                <a:latin typeface="+mj-lt"/>
+                <a:ea typeface="+mj-ea"/>
+                <a:cs typeface="+mj-cs"/>
+              </a:rPr>
               <a:t>)</a:t>
             </a:r>
-            <a:endParaRPr lang="tr-TR" b="1" dirty="0"/>
-          </a:p>
-        </p:txBody>
-      </p:sp>
-      <p:sp>
-        <p:nvSpPr>
-          <p:cNvPr id="3" name="2 İçerik Yer Tutucusu"/>
-          <p:cNvSpPr>
-            <a:spLocks noGrp="1"/>
-          </p:cNvSpPr>
-          <p:nvPr>
-            <p:ph idx="1"/>
-          </p:nvPr>
+            <a:endParaRPr kumimoji="0" lang="tr-TR" sz="3200" b="1" i="0" u="none" strike="noStrike" kern="1200" cap="none" spc="0" normalizeH="0" baseline="0" noProof="0" dirty="0">
+              <a:ln>
+                <a:noFill/>
+              </a:ln>
+              <a:solidFill>
+                <a:schemeClr val="tx1"/>
+              </a:solidFill>
+              <a:effectLst/>
+              <a:uLnTx/>
+              <a:uFillTx/>
+              <a:latin typeface="+mj-lt"/>
+              <a:ea typeface="+mj-ea"/>
+              <a:cs typeface="+mj-cs"/>
+            </a:endParaRPr>
+          </a:p>
+        </p:txBody>
+      </p:sp>
+      <p:sp>
+        <p:nvSpPr>
+          <p:cNvPr id="5" name="2 İçerik Yer Tutucusu"/>
+          <p:cNvSpPr txBox="1">
+            <a:spLocks/>
+          </p:cNvSpPr>
+          <p:nvPr/>
         </p:nvSpPr>
         <p:spPr>
           <a:xfrm>
-            <a:off x="457200" y="2420888"/>
-            <a:ext cx="8229600" cy="3705275"/>
+            <a:off x="619944" y="5013176"/>
+            <a:ext cx="8229600" cy="1512168"/>
           </a:xfrm>
+          <a:prstGeom prst="rect">
+            <a:avLst/>
+          </a:prstGeom>
         </p:spPr>
         <p:txBody>
-          <a:bodyPr>
-            <a:normAutofit fontScale="92500" lnSpcReduction="10000"/>
+          <a:bodyPr vert="horz" lIns="91440" tIns="45720" rIns="91440" bIns="45720" rtlCol="0">
+            <a:normAutofit/>
           </a:bodyPr>
           <a:lstStyle/>
           <a:p>
-            <a:r>
-              <a:rPr lang="tr-TR" sz="2400" dirty="0" err="1" smtClean="0"/>
-              <a:t>Chen</a:t>
-            </a:r>
-            <a:r>
-              <a:rPr lang="tr-TR" sz="2400" dirty="0" smtClean="0"/>
-              <a:t> </a:t>
-            </a:r>
-            <a:r>
-              <a:rPr lang="tr-TR" sz="2400" dirty="0" err="1" smtClean="0"/>
-              <a:t>Yangyang</a:t>
-            </a:r>
-            <a:r>
-              <a:rPr lang="tr-TR" sz="2400" dirty="0" smtClean="0"/>
-              <a:t>, </a:t>
-            </a:r>
-            <a:r>
-              <a:rPr lang="tr-TR" sz="2400" dirty="0" err="1" smtClean="0"/>
-              <a:t>Yang</a:t>
-            </a:r>
-            <a:r>
-              <a:rPr lang="tr-TR" sz="2400" dirty="0" smtClean="0"/>
-              <a:t> M., </a:t>
-            </a:r>
-            <a:r>
-              <a:rPr lang="tr-TR" sz="2400" dirty="0" err="1" smtClean="0"/>
-              <a:t>Long</a:t>
-            </a:r>
-            <a:r>
-              <a:rPr lang="tr-TR" sz="2400" dirty="0" smtClean="0"/>
-              <a:t> J., Hu K., </a:t>
-            </a:r>
-            <a:r>
-              <a:rPr lang="tr-TR" sz="2400" dirty="0" err="1" smtClean="0"/>
-              <a:t>Xu</a:t>
-            </a:r>
-            <a:r>
-              <a:rPr lang="tr-TR" sz="2400" dirty="0" smtClean="0"/>
-              <a:t> D., </a:t>
-            </a:r>
-            <a:r>
-              <a:rPr lang="tr-TR" sz="2400" dirty="0" err="1" smtClean="0"/>
-              <a:t>Blaabjerg</a:t>
-            </a:r>
-            <a:r>
-              <a:rPr lang="tr-TR" sz="2400" dirty="0" smtClean="0"/>
-              <a:t> F., </a:t>
-            </a:r>
-            <a:r>
-              <a:rPr lang="en-US" sz="2400" dirty="0" smtClean="0"/>
-              <a:t>Analysis of Oscillation Frequency Deviation in Elastic Coupling Digital Drive System and Robust Notch Filter Strategy</a:t>
-            </a:r>
-            <a:r>
-              <a:rPr lang="tr-TR" sz="2400" dirty="0" smtClean="0"/>
+            <a:pPr marL="342900" lvl="0" indent="-342900">
+              <a:spcBef>
+                <a:spcPct val="20000"/>
+              </a:spcBef>
+              <a:buFont typeface="Arial" pitchFamily="34" charset="0"/>
+              <a:buChar char="•"/>
+            </a:pPr>
+            <a:r>
+              <a:rPr lang="de-DE" sz="2800" dirty="0" smtClean="0"/>
+              <a:t>Yang S</a:t>
+            </a:r>
+            <a:r>
+              <a:rPr lang="tr-TR" sz="2800" dirty="0" smtClean="0"/>
+              <a:t>.</a:t>
+            </a:r>
+            <a:r>
+              <a:rPr lang="de-DE" sz="2800" dirty="0" smtClean="0"/>
+              <a:t>M</a:t>
+            </a:r>
+            <a:r>
+              <a:rPr lang="tr-TR" sz="2800" dirty="0" smtClean="0"/>
+              <a:t>., </a:t>
+            </a:r>
+            <a:r>
+              <a:rPr lang="tr-TR" sz="2800" dirty="0" err="1" smtClean="0"/>
+              <a:t>Wang</a:t>
+            </a:r>
+            <a:r>
+              <a:rPr lang="tr-TR" sz="2800" dirty="0" smtClean="0"/>
+              <a:t> S., </a:t>
+            </a:r>
+            <a:r>
+              <a:rPr lang="en-US" sz="2800" dirty="0" smtClean="0"/>
+              <a:t>The detection of Resonance frequency in motion control systems</a:t>
+            </a:r>
+            <a:r>
+              <a:rPr kumimoji="0" lang="tr-TR" sz="2800" b="0" i="0" u="none" strike="noStrike" kern="1200" cap="none" spc="0" normalizeH="0" baseline="0" noProof="0" dirty="0" smtClean="0">
+                <a:ln>
+                  <a:noFill/>
+                </a:ln>
+                <a:solidFill>
+                  <a:schemeClr val="tx1"/>
+                </a:solidFill>
+                <a:effectLst/>
+                <a:uLnTx/>
+                <a:uFillTx/>
+                <a:latin typeface="+mn-lt"/>
+                <a:ea typeface="+mn-ea"/>
+                <a:cs typeface="+mn-cs"/>
+              </a:rPr>
               <a:t>, IEEE </a:t>
             </a:r>
             <a:r>
-              <a:rPr lang="tr-TR" sz="2400" dirty="0" err="1" smtClean="0"/>
+              <a:rPr kumimoji="0" lang="tr-TR" sz="2800" b="0" i="0" u="none" strike="noStrike" kern="1200" cap="none" spc="0" normalizeH="0" baseline="0" noProof="0" dirty="0" err="1" smtClean="0">
+                <a:ln>
+                  <a:noFill/>
+                </a:ln>
+                <a:solidFill>
+                  <a:schemeClr val="tx1"/>
+                </a:solidFill>
+                <a:effectLst/>
+                <a:uLnTx/>
+                <a:uFillTx/>
+                <a:latin typeface="+mn-lt"/>
+                <a:ea typeface="+mn-ea"/>
+                <a:cs typeface="+mn-cs"/>
+              </a:rPr>
               <a:t>Transactions</a:t>
             </a:r>
             <a:r>
-              <a:rPr lang="tr-TR" sz="2400" dirty="0" smtClean="0"/>
+              <a:rPr kumimoji="0" lang="tr-TR" sz="2800" b="0" i="0" u="none" strike="noStrike" kern="1200" cap="none" spc="0" normalizeH="0" baseline="0" noProof="0" dirty="0" smtClean="0">
+                <a:ln>
+                  <a:noFill/>
+                </a:ln>
+                <a:solidFill>
+                  <a:schemeClr val="tx1"/>
+                </a:solidFill>
+                <a:effectLst/>
+                <a:uLnTx/>
+                <a:uFillTx/>
+                <a:latin typeface="+mn-lt"/>
+                <a:ea typeface="+mn-ea"/>
+                <a:cs typeface="+mn-cs"/>
+              </a:rPr>
               <a:t> on </a:t>
             </a:r>
             <a:r>
-              <a:rPr lang="tr-TR" sz="2400" dirty="0" err="1" smtClean="0"/>
-              <a:t>Industrial</a:t>
-            </a:r>
-            <a:r>
-              <a:rPr lang="tr-TR" sz="2400" dirty="0" smtClean="0"/>
-              <a:t> </a:t>
-            </a:r>
-            <a:r>
-              <a:rPr lang="tr-TR" sz="2400" dirty="0" err="1" smtClean="0"/>
-              <a:t>Electronics</a:t>
-            </a:r>
-            <a:r>
-              <a:rPr lang="tr-TR" sz="2400" dirty="0" smtClean="0"/>
-              <a:t>, 2019.</a:t>
-            </a:r>
-          </a:p>
-          <a:p>
-            <a:r>
-              <a:rPr lang="tr-TR" dirty="0" smtClean="0"/>
-              <a:t>FFT </a:t>
-            </a:r>
-            <a:r>
-              <a:rPr lang="tr-TR" dirty="0" err="1" smtClean="0"/>
-              <a:t>Based</a:t>
-            </a:r>
-            <a:r>
-              <a:rPr lang="tr-TR" dirty="0" smtClean="0"/>
-              <a:t> </a:t>
-            </a:r>
-            <a:r>
-              <a:rPr lang="tr-TR" dirty="0" err="1" smtClean="0"/>
-              <a:t>solutions</a:t>
-            </a:r>
-            <a:endParaRPr lang="tr-TR" dirty="0" smtClean="0"/>
-          </a:p>
-          <a:p>
-            <a:pPr lvl="1"/>
-            <a:r>
-              <a:rPr lang="tr-TR" dirty="0" smtClean="0"/>
-              <a:t>Online </a:t>
-            </a:r>
-            <a:r>
-              <a:rPr lang="tr-TR" dirty="0" err="1" smtClean="0"/>
-              <a:t>Adaptive</a:t>
-            </a:r>
-            <a:r>
-              <a:rPr lang="tr-TR" dirty="0" smtClean="0"/>
-              <a:t> </a:t>
-            </a:r>
-            <a:r>
-              <a:rPr lang="tr-TR" dirty="0" err="1" smtClean="0"/>
-              <a:t>Notch</a:t>
-            </a:r>
-            <a:r>
-              <a:rPr lang="tr-TR" dirty="0" smtClean="0"/>
-              <a:t> </a:t>
-            </a:r>
-            <a:r>
-              <a:rPr lang="tr-TR" dirty="0" err="1" smtClean="0"/>
-              <a:t>Filter</a:t>
-            </a:r>
-            <a:r>
-              <a:rPr lang="tr-TR" dirty="0" smtClean="0"/>
-              <a:t> (OANF)</a:t>
-            </a:r>
-          </a:p>
-          <a:p>
-            <a:pPr lvl="1"/>
-            <a:r>
-              <a:rPr lang="tr-TR" dirty="0" err="1" smtClean="0"/>
-              <a:t>Robust</a:t>
-            </a:r>
-            <a:r>
-              <a:rPr lang="tr-TR" dirty="0" smtClean="0"/>
-              <a:t> Online </a:t>
-            </a:r>
-            <a:r>
-              <a:rPr lang="tr-TR" dirty="0" err="1" smtClean="0"/>
-              <a:t>Adaptive</a:t>
-            </a:r>
-            <a:r>
-              <a:rPr lang="tr-TR" dirty="0" smtClean="0"/>
-              <a:t> </a:t>
-            </a:r>
-            <a:r>
-              <a:rPr lang="tr-TR" dirty="0" err="1" smtClean="0"/>
-              <a:t>Notch</a:t>
-            </a:r>
-            <a:r>
-              <a:rPr lang="tr-TR" dirty="0" smtClean="0"/>
-              <a:t> </a:t>
-            </a:r>
-            <a:r>
-              <a:rPr lang="tr-TR" dirty="0" err="1" smtClean="0"/>
-              <a:t>Filter</a:t>
-            </a:r>
-            <a:r>
-              <a:rPr lang="tr-TR" dirty="0" smtClean="0"/>
-              <a:t> (ROANF)</a:t>
-            </a:r>
-          </a:p>
-          <a:p>
-            <a:pPr lvl="1">
-              <a:buNone/>
-            </a:pPr>
-            <a:r>
-              <a:rPr lang="tr-TR" dirty="0" smtClean="0"/>
-              <a:t>DSP CORTEX A9 </a:t>
-            </a:r>
-            <a:r>
-              <a:rPr lang="tr-TR" dirty="0" smtClean="0">
-                <a:sym typeface="Wingdings" pitchFamily="2" charset="2"/>
+              <a:rPr kumimoji="0" lang="tr-TR" sz="2800" b="0" i="0" u="none" strike="noStrike" kern="1200" cap="none" spc="0" normalizeH="0" baseline="0" noProof="0" dirty="0" err="1" smtClean="0">
+                <a:ln>
+                  <a:noFill/>
+                </a:ln>
+                <a:solidFill>
+                  <a:schemeClr val="tx1"/>
+                </a:solidFill>
+                <a:effectLst/>
+                <a:uLnTx/>
+                <a:uFillTx/>
+                <a:latin typeface="+mn-lt"/>
+                <a:ea typeface="+mn-ea"/>
+                <a:cs typeface="+mn-cs"/>
               </a:rPr>
-              <a:t> </a:t>
-            </a:r>
-            <a:r>
-              <a:rPr lang="tr-TR" dirty="0" err="1" smtClean="0">
-                <a:sym typeface="Wingdings" pitchFamily="2" charset="2"/>
+              <a:t>Industry</a:t>
+            </a:r>
+            <a:r>
+              <a:rPr kumimoji="0" lang="tr-TR" sz="2800" b="0" i="0" u="none" strike="noStrike" kern="1200" cap="none" spc="0" normalizeH="0" noProof="0" dirty="0" smtClean="0">
+                <a:ln>
+                  <a:noFill/>
+                </a:ln>
+                <a:solidFill>
+                  <a:schemeClr val="tx1"/>
+                </a:solidFill>
+                <a:effectLst/>
+                <a:uLnTx/>
+                <a:uFillTx/>
+                <a:latin typeface="+mn-lt"/>
+                <a:ea typeface="+mn-ea"/>
+                <a:cs typeface="+mn-cs"/>
               </a:rPr>
-              <a:t>Speed</a:t>
-            </a:r>
-            <a:r>
-              <a:rPr lang="tr-TR" dirty="0" smtClean="0">
-                <a:sym typeface="Wingdings" pitchFamily="2" charset="2"/>
+              <a:t> </a:t>
+            </a:r>
+            <a:r>
+              <a:rPr kumimoji="0" lang="tr-TR" sz="2800" b="0" i="0" u="none" strike="noStrike" kern="1200" cap="none" spc="0" normalizeH="0" noProof="0" dirty="0" err="1" smtClean="0">
+                <a:ln>
+                  <a:noFill/>
+                </a:ln>
+                <a:solidFill>
+                  <a:schemeClr val="tx1"/>
+                </a:solidFill>
+                <a:effectLst/>
+                <a:uLnTx/>
+                <a:uFillTx/>
+                <a:latin typeface="+mn-lt"/>
+                <a:ea typeface="+mn-ea"/>
+                <a:cs typeface="+mn-cs"/>
               </a:rPr>
-              <a:t> </a:t>
-            </a:r>
-            <a:r>
-              <a:rPr lang="tr-TR" dirty="0" err="1" smtClean="0">
-                <a:sym typeface="Wingdings" pitchFamily="2" charset="2"/>
+              <a:t>Applications</a:t>
+            </a:r>
+            <a:r>
+              <a:rPr kumimoji="0" lang="tr-TR" sz="2800" b="0" i="0" u="none" strike="noStrike" kern="1200" cap="none" spc="0" normalizeH="0" baseline="0" noProof="0" dirty="0" smtClean="0">
+                <a:ln>
+                  <a:noFill/>
+                </a:ln>
+                <a:solidFill>
+                  <a:schemeClr val="tx1"/>
+                </a:solidFill>
+                <a:effectLst/>
+                <a:uLnTx/>
+                <a:uFillTx/>
+                <a:latin typeface="+mn-lt"/>
+                <a:ea typeface="+mn-ea"/>
+                <a:cs typeface="+mn-cs"/>
               </a:rPr>
-              <a:t>loop</a:t>
-            </a:r>
-            <a:r>
-              <a:rPr lang="tr-TR" dirty="0" smtClean="0">
-                <a:sym typeface="Wingdings" pitchFamily="2" charset="2"/>
-              </a:rPr>
-              <a:t> </a:t>
-            </a:r>
-            <a:r>
-              <a:rPr lang="tr-TR" dirty="0" err="1" smtClean="0">
-                <a:sym typeface="Wingdings" pitchFamily="2" charset="2"/>
-              </a:rPr>
-              <a:t>and</a:t>
-            </a:r>
-            <a:r>
-              <a:rPr lang="tr-TR" dirty="0" smtClean="0">
-                <a:sym typeface="Wingdings" pitchFamily="2" charset="2"/>
-              </a:rPr>
-              <a:t> ROANF</a:t>
-            </a:r>
-          </a:p>
-          <a:p>
-            <a:pPr lvl="1">
-              <a:buNone/>
-            </a:pPr>
-            <a:r>
-              <a:rPr lang="tr-TR" dirty="0" smtClean="0">
-                <a:sym typeface="Wingdings" pitchFamily="2" charset="2"/>
-              </a:rPr>
-              <a:t>FPGA  </a:t>
-            </a:r>
-            <a:r>
-              <a:rPr lang="tr-TR" dirty="0" err="1" smtClean="0">
-                <a:sym typeface="Wingdings" pitchFamily="2" charset="2"/>
-              </a:rPr>
-              <a:t>Current</a:t>
-            </a:r>
-            <a:r>
-              <a:rPr lang="tr-TR" dirty="0" smtClean="0">
-                <a:sym typeface="Wingdings" pitchFamily="2" charset="2"/>
-              </a:rPr>
-              <a:t> </a:t>
-            </a:r>
-            <a:r>
-              <a:rPr lang="tr-TR" dirty="0" err="1" smtClean="0">
-                <a:sym typeface="Wingdings" pitchFamily="2" charset="2"/>
-              </a:rPr>
-              <a:t>Loop</a:t>
-            </a:r>
-            <a:r>
-              <a:rPr lang="tr-TR" dirty="0" smtClean="0">
-                <a:sym typeface="Wingdings" pitchFamily="2" charset="2"/>
-              </a:rPr>
-              <a:t> </a:t>
-            </a:r>
-            <a:r>
-              <a:rPr lang="tr-TR" dirty="0" err="1" smtClean="0">
-                <a:sym typeface="Wingdings" pitchFamily="2" charset="2"/>
-              </a:rPr>
-              <a:t>and</a:t>
-            </a:r>
-            <a:r>
-              <a:rPr lang="tr-TR" dirty="0" smtClean="0">
-                <a:sym typeface="Wingdings" pitchFamily="2" charset="2"/>
-              </a:rPr>
-              <a:t> FFT </a:t>
-            </a:r>
-            <a:r>
-              <a:rPr lang="tr-TR" dirty="0" err="1" smtClean="0">
-                <a:sym typeface="Wingdings" pitchFamily="2" charset="2"/>
-              </a:rPr>
-              <a:t>analysis</a:t>
-            </a:r>
-            <a:r>
-              <a:rPr lang="tr-TR" dirty="0" smtClean="0"/>
-              <a:t> </a:t>
-            </a:r>
-            <a:endParaRPr lang="tr-TR" dirty="0"/>
+              <a:t>, 2014</a:t>
+            </a:r>
+            <a:endParaRPr kumimoji="0" lang="tr-TR" sz="2800" b="0" i="0" u="none" strike="noStrike" kern="1200" cap="none" spc="0" normalizeH="0" baseline="0" noProof="0" dirty="0">
+              <a:ln>
+                <a:noFill/>
+              </a:ln>
+              <a:solidFill>
+                <a:schemeClr val="tx1"/>
+              </a:solidFill>
+              <a:effectLst/>
+              <a:uLnTx/>
+              <a:uFillTx/>
+              <a:latin typeface="+mn-lt"/>
+              <a:ea typeface="+mn-ea"/>
+              <a:cs typeface="+mn-cs"/>
+            </a:endParaRPr>
           </a:p>
         </p:txBody>
       </p:sp>

</xml_diff>